<commit_message>
Added narrated module 6, and updated non-narrated version.
</commit_message>
<xml_diff>
--- a/University of Washington Class/Module 6 - Volt-VAR optimization.pptx
+++ b/University of Washington Class/Module 6 - Volt-VAR optimization.pptx
@@ -5,7 +5,7 @@
     <p:sldMasterId id="2147483648" r:id="rId1"/>
   </p:sldMasterIdLst>
   <p:notesMasterIdLst>
-    <p:notesMasterId r:id="rId44"/>
+    <p:notesMasterId r:id="rId43"/>
   </p:notesMasterIdLst>
   <p:sldIdLst>
     <p:sldId id="256" r:id="rId2"/>
@@ -14,42 +14,41 @@
     <p:sldId id="297" r:id="rId5"/>
     <p:sldId id="272" r:id="rId6"/>
     <p:sldId id="271" r:id="rId7"/>
-    <p:sldId id="322" r:id="rId8"/>
-    <p:sldId id="273" r:id="rId9"/>
-    <p:sldId id="286" r:id="rId10"/>
-    <p:sldId id="320" r:id="rId11"/>
-    <p:sldId id="323" r:id="rId12"/>
-    <p:sldId id="335" r:id="rId13"/>
-    <p:sldId id="336" r:id="rId14"/>
-    <p:sldId id="337" r:id="rId15"/>
-    <p:sldId id="351" r:id="rId16"/>
-    <p:sldId id="338" r:id="rId17"/>
-    <p:sldId id="352" r:id="rId18"/>
-    <p:sldId id="339" r:id="rId19"/>
-    <p:sldId id="355" r:id="rId20"/>
-    <p:sldId id="354" r:id="rId21"/>
-    <p:sldId id="340" r:id="rId22"/>
-    <p:sldId id="341" r:id="rId23"/>
-    <p:sldId id="344" r:id="rId24"/>
-    <p:sldId id="345" r:id="rId25"/>
-    <p:sldId id="348" r:id="rId26"/>
-    <p:sldId id="346" r:id="rId27"/>
-    <p:sldId id="347" r:id="rId28"/>
-    <p:sldId id="342" r:id="rId29"/>
-    <p:sldId id="343" r:id="rId30"/>
-    <p:sldId id="324" r:id="rId31"/>
-    <p:sldId id="357" r:id="rId32"/>
-    <p:sldId id="358" r:id="rId33"/>
-    <p:sldId id="359" r:id="rId34"/>
-    <p:sldId id="360" r:id="rId35"/>
-    <p:sldId id="361" r:id="rId36"/>
-    <p:sldId id="362" r:id="rId37"/>
-    <p:sldId id="363" r:id="rId38"/>
-    <p:sldId id="261" r:id="rId39"/>
-    <p:sldId id="328" r:id="rId40"/>
-    <p:sldId id="330" r:id="rId41"/>
-    <p:sldId id="329" r:id="rId42"/>
-    <p:sldId id="356" r:id="rId43"/>
+    <p:sldId id="273" r:id="rId8"/>
+    <p:sldId id="286" r:id="rId9"/>
+    <p:sldId id="320" r:id="rId10"/>
+    <p:sldId id="323" r:id="rId11"/>
+    <p:sldId id="335" r:id="rId12"/>
+    <p:sldId id="336" r:id="rId13"/>
+    <p:sldId id="337" r:id="rId14"/>
+    <p:sldId id="351" r:id="rId15"/>
+    <p:sldId id="338" r:id="rId16"/>
+    <p:sldId id="352" r:id="rId17"/>
+    <p:sldId id="339" r:id="rId18"/>
+    <p:sldId id="355" r:id="rId19"/>
+    <p:sldId id="354" r:id="rId20"/>
+    <p:sldId id="340" r:id="rId21"/>
+    <p:sldId id="341" r:id="rId22"/>
+    <p:sldId id="344" r:id="rId23"/>
+    <p:sldId id="345" r:id="rId24"/>
+    <p:sldId id="348" r:id="rId25"/>
+    <p:sldId id="346" r:id="rId26"/>
+    <p:sldId id="347" r:id="rId27"/>
+    <p:sldId id="342" r:id="rId28"/>
+    <p:sldId id="343" r:id="rId29"/>
+    <p:sldId id="324" r:id="rId30"/>
+    <p:sldId id="357" r:id="rId31"/>
+    <p:sldId id="358" r:id="rId32"/>
+    <p:sldId id="359" r:id="rId33"/>
+    <p:sldId id="360" r:id="rId34"/>
+    <p:sldId id="361" r:id="rId35"/>
+    <p:sldId id="362" r:id="rId36"/>
+    <p:sldId id="363" r:id="rId37"/>
+    <p:sldId id="261" r:id="rId38"/>
+    <p:sldId id="328" r:id="rId39"/>
+    <p:sldId id="330" r:id="rId40"/>
+    <p:sldId id="329" r:id="rId41"/>
+    <p:sldId id="356" r:id="rId42"/>
   </p:sldIdLst>
   <p:sldSz cx="9144000" cy="6858000" type="screen4x3"/>
   <p:notesSz cx="6858000" cy="9144000"/>
@@ -234,7 +233,7 @@
             <a:fld id="{30456DE2-1550-4DE2-8C7A-8D9992B45402}" type="datetimeFigureOut">
               <a:rPr lang="en-US" smtClean="0"/>
               <a:pPr/>
-              <a:t>12/30/2011</a:t>
+              <a:t>1/8/2012</a:t>
             </a:fld>
             <a:endParaRPr lang="en-US"/>
           </a:p>
@@ -686,7 +685,7 @@
           <a:p>
             <a:fld id="{6519E7BD-BA7F-4B81-A129-70E95F6DF237}" type="datetime1">
               <a:rPr lang="en-US" smtClean="0"/>
-              <a:t>12/30/2011</a:t>
+              <a:t>1/8/2012</a:t>
             </a:fld>
             <a:endParaRPr lang="en-US"/>
           </a:p>
@@ -955,7 +954,7 @@
           <a:p>
             <a:fld id="{ED390F24-4C39-4969-AF25-1239CA7FF3DE}" type="datetime1">
               <a:rPr lang="en-US" smtClean="0"/>
-              <a:t>12/30/2011</a:t>
+              <a:t>1/8/2012</a:t>
             </a:fld>
             <a:endParaRPr lang="en-US"/>
           </a:p>
@@ -1131,7 +1130,7 @@
           <a:p>
             <a:fld id="{C34E4A9B-9920-4234-AEB4-5607845725C0}" type="datetime1">
               <a:rPr lang="en-US" smtClean="0"/>
-              <a:t>12/30/2011</a:t>
+              <a:t>1/8/2012</a:t>
             </a:fld>
             <a:endParaRPr lang="en-US"/>
           </a:p>
@@ -1297,7 +1296,7 @@
           <a:p>
             <a:fld id="{4EB4F7BD-B02C-4562-9C64-672E469C9760}" type="datetime1">
               <a:rPr lang="en-US" smtClean="0"/>
-              <a:t>12/30/2011</a:t>
+              <a:t>1/8/2012</a:t>
             </a:fld>
             <a:endParaRPr lang="en-US" dirty="0"/>
           </a:p>
@@ -1539,7 +1538,7 @@
           <a:p>
             <a:fld id="{3E4D7124-CB27-4A90-BE7A-D1E0ABDB04C5}" type="datetime1">
               <a:rPr lang="en-US" smtClean="0"/>
-              <a:t>12/30/2011</a:t>
+              <a:t>1/8/2012</a:t>
             </a:fld>
             <a:endParaRPr lang="en-US"/>
           </a:p>
@@ -1823,7 +1822,7 @@
           <a:p>
             <a:fld id="{CA5669D2-688D-4573-B135-CCF7B5BC920F}" type="datetime1">
               <a:rPr lang="en-US" smtClean="0"/>
-              <a:t>12/30/2011</a:t>
+              <a:t>1/8/2012</a:t>
             </a:fld>
             <a:endParaRPr lang="en-US"/>
           </a:p>
@@ -2241,7 +2240,7 @@
           <a:p>
             <a:fld id="{30FFD320-1AEF-4D74-B2A0-E24E0249BEC1}" type="datetime1">
               <a:rPr lang="en-US" smtClean="0"/>
-              <a:t>12/30/2011</a:t>
+              <a:t>1/8/2012</a:t>
             </a:fld>
             <a:endParaRPr lang="en-US"/>
           </a:p>
@@ -2355,7 +2354,7 @@
           <a:p>
             <a:fld id="{BB15CDF8-705B-4637-AE33-67119B125F3D}" type="datetime1">
               <a:rPr lang="en-US" smtClean="0"/>
-              <a:t>12/30/2011</a:t>
+              <a:t>1/8/2012</a:t>
             </a:fld>
             <a:endParaRPr lang="en-US"/>
           </a:p>
@@ -2446,7 +2445,7 @@
           <a:p>
             <a:fld id="{0A6B3399-1807-4B55-9AC1-576C7016240D}" type="datetime1">
               <a:rPr lang="en-US" smtClean="0"/>
-              <a:t>12/30/2011</a:t>
+              <a:t>1/8/2012</a:t>
             </a:fld>
             <a:endParaRPr lang="en-US"/>
           </a:p>
@@ -2719,7 +2718,7 @@
           <a:p>
             <a:fld id="{AABB4BFE-5A26-46CE-87FE-B0B3FFEF3620}" type="datetime1">
               <a:rPr lang="en-US" smtClean="0"/>
-              <a:t>12/30/2011</a:t>
+              <a:t>1/8/2012</a:t>
             </a:fld>
             <a:endParaRPr lang="en-US"/>
           </a:p>
@@ -2968,7 +2967,7 @@
           <a:p>
             <a:fld id="{215422AA-CF2D-439D-80CB-DD01E7ACDE11}" type="datetime1">
               <a:rPr lang="en-US" smtClean="0"/>
-              <a:t>12/30/2011</a:t>
+              <a:t>1/8/2012</a:t>
             </a:fld>
             <a:endParaRPr lang="en-US"/>
           </a:p>
@@ -3181,7 +3180,7 @@
           <a:p>
             <a:fld id="{1129FE10-ACD9-430D-B7E5-C58C92EFD52A}" type="datetime1">
               <a:rPr lang="en-US" smtClean="0"/>
-              <a:t>12/30/2011</a:t>
+              <a:t>1/8/2012</a:t>
             </a:fld>
             <a:endParaRPr lang="en-US" dirty="0"/>
           </a:p>
@@ -3705,7 +3704,15 @@
           <a:p>
             <a:r>
               <a:rPr lang="en-US" dirty="0" smtClean="0"/>
-              <a:t>Volt-VAR Optimization</a:t>
+              <a:t>Volt-VAR Optimization </a:t>
+            </a:r>
+            <a:r>
+              <a:rPr lang="en-US" dirty="0" smtClean="0"/>
+              <a:t>Cont</a:t>
+            </a:r>
+            <a:r>
+              <a:rPr lang="en-US" dirty="0" smtClean="0"/>
+              <a:t>.</a:t>
             </a:r>
             <a:endParaRPr lang="en-US" dirty="0"/>
           </a:p>
@@ -3729,51 +3736,74 @@
           <a:lstStyle/>
           <a:p>
             <a:r>
-              <a:rPr lang="en-US" dirty="0" smtClean="0"/>
-              <a:t>Voltage Reduction</a:t>
+              <a:rPr lang="en-US" sz="2000" dirty="0"/>
+              <a:t>There are numerous Volt-VAR optimization options commercially available:</a:t>
             </a:r>
           </a:p>
           <a:p>
             <a:pPr lvl="1"/>
             <a:r>
-              <a:rPr lang="en-US" dirty="0" smtClean="0"/>
-              <a:t>When lowering the voltage it is necessary to ensure that the voltage on all points of the system remain within specifications. </a:t>
+              <a:rPr lang="en-US" sz="1800" dirty="0"/>
+              <a:t>General Electric: Coordinated Volt-VAR Control</a:t>
             </a:r>
           </a:p>
           <a:p>
             <a:pPr lvl="1"/>
             <a:r>
-              <a:rPr lang="en-US" dirty="0" smtClean="0"/>
-              <a:t>The use of End Of Line (EOL) measurements can help to ensure that voltages at remote points are not too low.</a:t>
+              <a:rPr lang="en-US" sz="1800" dirty="0"/>
+              <a:t>Cooper: Integrated Volt VAR Control</a:t>
             </a:r>
           </a:p>
           <a:p>
             <a:pPr lvl="1"/>
             <a:r>
-              <a:rPr lang="en-US" dirty="0" smtClean="0"/>
-              <a:t>This is similar to operating a regulator in “REMOTE” except that there can be multiple measurement points.</a:t>
-            </a:r>
-          </a:p>
-          <a:p>
-            <a:r>
-              <a:rPr lang="en-US" dirty="0" smtClean="0"/>
-              <a:t>VAR Optimization</a:t>
+              <a:rPr lang="en-US" sz="1800" dirty="0"/>
+              <a:t>ABB: Volt VAR Optimization</a:t>
             </a:r>
           </a:p>
           <a:p>
             <a:pPr lvl="1"/>
             <a:r>
-              <a:rPr lang="en-US" dirty="0" smtClean="0"/>
-              <a:t>When capacitors operate based on local readings there is no regard for the rest of the system.</a:t>
+              <a:rPr lang="en-US" sz="1800" dirty="0"/>
+              <a:t>PCS UtiliData: AdaptiVolt</a:t>
             </a:r>
           </a:p>
           <a:p>
             <a:pPr lvl="1"/>
-            <a:r>
-              <a:rPr lang="en-US" dirty="0" smtClean="0"/>
-              <a:t>VAR optimization allows capacitors to work in a coordinate manner to reduce overall reactive power flows, thus reducing system losses.</a:t>
-            </a:r>
             <a:endParaRPr lang="en-US" dirty="0"/>
+          </a:p>
+          <a:p>
+            <a:r>
+              <a:rPr lang="en-US" sz="2000" dirty="0"/>
+              <a:t>The capabilities and cost of these commercially available products varies.</a:t>
+            </a:r>
+          </a:p>
+          <a:p>
+            <a:pPr lvl="1"/>
+            <a:endParaRPr lang="en-US" dirty="0"/>
+          </a:p>
+          <a:p>
+            <a:r>
+              <a:rPr lang="en-US" sz="2000" dirty="0"/>
+              <a:t>There are also numerous academic papers on the topic.  We will examine the following method:</a:t>
+            </a:r>
+          </a:p>
+          <a:p>
+            <a:pPr lvl="1">
+              <a:buNone/>
+            </a:pPr>
+            <a:r>
+              <a:rPr lang="en-US" dirty="0"/>
+              <a:t>   “V. Borozan, M. Baran, and D. Novosel, “Integrated Volt/VAR Control in Distribution Systems”, </a:t>
+            </a:r>
+            <a:r>
+              <a:rPr lang="en-US" i="1" dirty="0"/>
+              <a:t>IEEE PES Winter Meeting</a:t>
+            </a:r>
+            <a:r>
+              <a:rPr lang="en-US" dirty="0"/>
+              <a:t>, 2001.”</a:t>
+            </a:r>
           </a:p>
         </p:txBody>
       </p:sp>
@@ -3849,10 +3879,9 @@
           <a:lstStyle/>
           <a:p>
             <a:r>
-              <a:rPr lang="en-US" dirty="0" smtClean="0"/>
-              <a:t>Volt-VAR Optimization cont.</a:t>
-            </a:r>
-            <a:endParaRPr lang="en-US" dirty="0"/>
+              <a:rPr lang="en-US" dirty="0"/>
+              <a:t>Borozan, Baran, and Novosel Implementation</a:t>
+            </a:r>
           </a:p>
         </p:txBody>
       </p:sp>
@@ -3869,103 +3898,64 @@
         <p:spPr/>
         <p:txBody>
           <a:bodyPr>
-            <a:normAutofit fontScale="92500" lnSpcReduction="20000"/>
+            <a:normAutofit/>
           </a:bodyPr>
           <a:lstStyle/>
           <a:p>
             <a:r>
               <a:rPr lang="en-US" dirty="0" smtClean="0"/>
-              <a:t>There are numerous Volt-VAR optimization options commercially available:</a:t>
+              <a:t>Simple control scheme</a:t>
+            </a:r>
+          </a:p>
+          <a:p>
+            <a:r>
+              <a:rPr lang="en-US" dirty="0" smtClean="0"/>
+              <a:t>Works for radial feeders</a:t>
             </a:r>
           </a:p>
           <a:p>
             <a:pPr lvl="1"/>
             <a:r>
               <a:rPr lang="en-US" dirty="0" smtClean="0"/>
-              <a:t>General Electric: Coordinated Volt-VAR Control</a:t>
+              <a:t>No “cross branch” optimization – each “regulator branch” handled independently</a:t>
             </a:r>
           </a:p>
           <a:p>
             <a:pPr lvl="1"/>
             <a:r>
               <a:rPr lang="en-US" dirty="0" smtClean="0"/>
-              <a:t>Cooper: Integrated Volt VAR Control</a:t>
+              <a:t>No downstream coordination – branches with multiple regulators may have voltage violations while things move</a:t>
             </a:r>
           </a:p>
           <a:p>
             <a:pPr lvl="1"/>
             <a:r>
               <a:rPr lang="en-US" dirty="0" smtClean="0"/>
-              <a:t>ABB: Volt VAR Optimization</a:t>
+              <a:t>Assumes no reverse energy power flow</a:t>
+            </a:r>
+          </a:p>
+          <a:p>
+            <a:r>
+              <a:rPr lang="en-US" dirty="0" smtClean="0"/>
+              <a:t>Two-stage process</a:t>
             </a:r>
           </a:p>
           <a:p>
             <a:pPr lvl="1"/>
             <a:r>
               <a:rPr lang="en-US" dirty="0" smtClean="0"/>
-              <a:t>PCS UtiliData: AdaptiVolt</a:t>
+              <a:t>Primary goal: optimize voltage – move the voltage to a desired set point</a:t>
             </a:r>
           </a:p>
           <a:p>
             <a:pPr lvl="1"/>
-            <a:endParaRPr lang="en-US" dirty="0" smtClean="0"/>
-          </a:p>
-          <a:p>
             <a:r>
               <a:rPr lang="en-US" dirty="0" smtClean="0"/>
-              <a:t>The capabilities and cost of these commercially available products varies.</a:t>
-            </a:r>
-          </a:p>
-          <a:p>
-            <a:pPr lvl="1"/>
-            <a:endParaRPr lang="en-US" dirty="0" smtClean="0"/>
-          </a:p>
-          <a:p>
-            <a:r>
-              <a:rPr lang="en-US" dirty="0" smtClean="0"/>
-              <a:t>There are also numerous academic papers on the topic.  We will examine the following method:</a:t>
-            </a:r>
-          </a:p>
-          <a:p>
-            <a:pPr lvl="1">
-              <a:buNone/>
-            </a:pPr>
-            <a:r>
-              <a:rPr lang="en-US" dirty="0" smtClean="0"/>
-              <a:t>   “V. </a:t>
-            </a:r>
-            <a:r>
-              <a:rPr lang="en-US" dirty="0" err="1" smtClean="0"/>
-              <a:t>Borozan</a:t>
-            </a:r>
-            <a:r>
-              <a:rPr lang="en-US" dirty="0" smtClean="0"/>
-              <a:t>, M. </a:t>
-            </a:r>
-            <a:r>
-              <a:rPr lang="en-US" dirty="0" err="1" smtClean="0"/>
-              <a:t>Baran</a:t>
-            </a:r>
-            <a:r>
-              <a:rPr lang="en-US" dirty="0" smtClean="0"/>
-              <a:t>, and D. </a:t>
-            </a:r>
-            <a:r>
-              <a:rPr lang="en-US" dirty="0" err="1" smtClean="0"/>
-              <a:t>Novosel</a:t>
-            </a:r>
-            <a:r>
-              <a:rPr lang="en-US" dirty="0" smtClean="0"/>
-              <a:t>, “Integrated Volt/VAR Control in Distribution Systems”, </a:t>
-            </a:r>
-            <a:r>
-              <a:rPr lang="en-US" i="1" dirty="0" smtClean="0"/>
-              <a:t>IEEE PES Winter Meeting</a:t>
-            </a:r>
-            <a:r>
-              <a:rPr lang="en-US" dirty="0" smtClean="0"/>
-              <a:t>, 2001.”</a:t>
-            </a:r>
+              <a:t>Secondary goal: optimize reactive power – switch capacitors to maintain power factor</a:t>
+            </a:r>
+          </a:p>
+          <a:p>
+            <a:endParaRPr lang="en-US" dirty="0"/>
           </a:p>
         </p:txBody>
       </p:sp>
@@ -3994,6 +3984,11 @@
         </p:txBody>
       </p:sp>
     </p:spTree>
+    <p:extLst>
+      <p:ext uri="{BB962C8B-B14F-4D97-AF65-F5344CB8AC3E}">
+        <p14:creationId xmlns:p14="http://schemas.microsoft.com/office/powerpoint/2010/main" val="3421393320"/>
+      </p:ext>
+    </p:extLst>
   </p:cSld>
   <p:clrMapOvr>
     <a:masterClrMapping/>
@@ -4037,13 +4032,20 @@
         </p:nvSpPr>
         <p:spPr/>
         <p:txBody>
-          <a:bodyPr/>
+          <a:bodyPr>
+            <a:normAutofit/>
+          </a:bodyPr>
           <a:lstStyle/>
           <a:p>
             <a:r>
               <a:rPr lang="en-US" dirty="0"/>
-              <a:t>Borozan, Baran, and Novosel Implementation</a:t>
-            </a:r>
+              <a:t>Borozan, Baran, and Novosel </a:t>
+            </a:r>
+            <a:r>
+              <a:rPr lang="en-US" dirty="0" smtClean="0"/>
+              <a:t>Implementation Cont.</a:t>
+            </a:r>
+            <a:endParaRPr lang="en-US" dirty="0"/>
           </a:p>
         </p:txBody>
       </p:sp>
@@ -4066,58 +4068,87 @@
           <a:p>
             <a:r>
               <a:rPr lang="en-US" dirty="0" smtClean="0"/>
-              <a:t>Simple control scheme</a:t>
-            </a:r>
-          </a:p>
-          <a:p>
+              <a:t>Stage 1: Voltage Optimization Objectives</a:t>
+            </a:r>
+          </a:p>
+          <a:p>
+            <a:pPr marL="971550" lvl="1" indent="-514350">
+              <a:buFont typeface="+mj-lt"/>
+              <a:buAutoNum type="arabicPeriod"/>
+            </a:pPr>
             <a:r>
               <a:rPr lang="en-US" dirty="0" smtClean="0"/>
-              <a:t>Works for radial feeders</a:t>
-            </a:r>
-          </a:p>
-          <a:p>
-            <a:pPr lvl="1"/>
+              <a:t>Determine the minimum voltage</a:t>
+            </a:r>
+          </a:p>
+          <a:p>
+            <a:pPr marL="971550" lvl="1" indent="-514350">
+              <a:buFont typeface="+mj-lt"/>
+              <a:buAutoNum type="arabicPeriod"/>
+            </a:pPr>
             <a:r>
               <a:rPr lang="en-US" dirty="0" smtClean="0"/>
-              <a:t>No “cross branch” optimization – each “regulator branch” handled independently</a:t>
-            </a:r>
-          </a:p>
-          <a:p>
-            <a:pPr lvl="1"/>
+              <a:t>Determine “state of the system”</a:t>
+            </a:r>
+          </a:p>
+          <a:p>
+            <a:pPr marL="971550" lvl="1" indent="-514350">
+              <a:buFont typeface="+mj-lt"/>
+              <a:buAutoNum type="arabicPeriod"/>
+            </a:pPr>
             <a:r>
               <a:rPr lang="en-US" dirty="0" smtClean="0"/>
-              <a:t>No downstream coordination – branches with multiple regulators may have voltage violations while things move</a:t>
-            </a:r>
-          </a:p>
-          <a:p>
-            <a:pPr lvl="1"/>
+              <a:t>Command regulators</a:t>
+            </a:r>
+          </a:p>
+          <a:p>
+            <a:endParaRPr lang="en-US" dirty="0" smtClean="0"/>
+          </a:p>
+          <a:p>
             <a:r>
               <a:rPr lang="en-US" dirty="0" smtClean="0"/>
-              <a:t>Assumes no reverse energy power flow</a:t>
-            </a:r>
-          </a:p>
-          <a:p>
+              <a:t>Stage 2: Reactive Power Optimization Objectives</a:t>
+            </a:r>
+            <a:endParaRPr lang="en-US" dirty="0"/>
+          </a:p>
+          <a:p>
+            <a:pPr marL="971550" lvl="1" indent="-514350">
+              <a:buFont typeface="+mj-lt"/>
+              <a:buAutoNum type="arabicPeriod"/>
+            </a:pPr>
             <a:r>
               <a:rPr lang="en-US" dirty="0" smtClean="0"/>
-              <a:t>Two-stage process</a:t>
-            </a:r>
-          </a:p>
-          <a:p>
-            <a:pPr lvl="1"/>
+              <a:t>Determine reactive power value</a:t>
+            </a:r>
+          </a:p>
+          <a:p>
+            <a:pPr marL="971550" lvl="1" indent="-514350">
+              <a:buFont typeface="+mj-lt"/>
+              <a:buAutoNum type="arabicPeriod"/>
+            </a:pPr>
             <a:r>
               <a:rPr lang="en-US" dirty="0" smtClean="0"/>
-              <a:t>Primary goal: optimize voltage – move the voltage to a desired set point</a:t>
-            </a:r>
-          </a:p>
-          <a:p>
-            <a:pPr lvl="1"/>
+              <a:t>Find next capacitor to </a:t>
+            </a:r>
             <a:r>
               <a:rPr lang="en-US" dirty="0" smtClean="0"/>
-              <a:t>Secondary goal: optimize reactive power – switch capacitors to maintain power factor</a:t>
-            </a:r>
-          </a:p>
-          <a:p>
-            <a:endParaRPr lang="en-US" dirty="0"/>
+              <a:t>switch</a:t>
+            </a:r>
+          </a:p>
+          <a:p>
+            <a:pPr marL="971550" lvl="1" indent="-514350">
+              <a:buFont typeface="+mj-lt"/>
+              <a:buAutoNum type="arabicPeriod"/>
+            </a:pPr>
+            <a:r>
+              <a:rPr lang="en-US"/>
+              <a:t>Command </a:t>
+            </a:r>
+            <a:r>
+              <a:rPr lang="en-US" smtClean="0"/>
+              <a:t>capacitors</a:t>
+            </a:r>
+            <a:endParaRPr lang="en-US"/>
           </a:p>
         </p:txBody>
       </p:sp>
@@ -4148,7 +4179,7 @@
     </p:spTree>
     <p:extLst>
       <p:ext uri="{BB962C8B-B14F-4D97-AF65-F5344CB8AC3E}">
-        <p14:creationId xmlns:p14="http://schemas.microsoft.com/office/powerpoint/2010/main" val="3421393320"/>
+        <p14:creationId xmlns:p14="http://schemas.microsoft.com/office/powerpoint/2010/main" val="483121065"/>
       </p:ext>
     </p:extLst>
   </p:cSld>
@@ -4200,12 +4231,8 @@
           <a:lstStyle/>
           <a:p>
             <a:r>
-              <a:rPr lang="en-US" dirty="0"/>
-              <a:t>Borozan, Baran, and Novosel </a:t>
-            </a:r>
-            <a:r>
               <a:rPr lang="en-US" dirty="0" smtClean="0"/>
-              <a:t>Implementation Cont.</a:t>
+              <a:t>VVO-Regulators – Voltage Optimization</a:t>
             </a:r>
             <a:endParaRPr lang="en-US" dirty="0"/>
           </a:p>
@@ -4228,71 +4255,191 @@
           </a:bodyPr>
           <a:lstStyle/>
           <a:p>
-            <a:r>
-              <a:rPr lang="en-US" dirty="0" smtClean="0"/>
-              <a:t>Stage 1: Voltage Optimization Objectives</a:t>
-            </a:r>
-          </a:p>
-          <a:p>
-            <a:pPr marL="971550" lvl="1" indent="-514350">
+            <a:pPr marL="514350" indent="-514350">
               <a:buFont typeface="+mj-lt"/>
               <a:buAutoNum type="arabicPeriod"/>
             </a:pPr>
             <a:r>
               <a:rPr lang="en-US" dirty="0" smtClean="0"/>
-              <a:t>Determine the minimum voltage</a:t>
-            </a:r>
-          </a:p>
-          <a:p>
-            <a:pPr marL="971550" lvl="1" indent="-514350">
+              <a:t>Determine </a:t>
+            </a:r>
+            <a:r>
+              <a:rPr lang="en-US" i="1" dirty="0" smtClean="0"/>
+              <a:t>minimum voltage</a:t>
+            </a:r>
+            <a:r>
+              <a:rPr lang="en-US" dirty="0" smtClean="0"/>
+              <a:t> in measurements and </a:t>
+            </a:r>
+            <a:r>
+              <a:rPr lang="en-US" i="1" dirty="0" smtClean="0"/>
+              <a:t>regulator load-side voltage</a:t>
+            </a:r>
+          </a:p>
+          <a:p>
+            <a:pPr marL="400050" lvl="1" indent="0">
+              <a:buNone/>
+            </a:pPr>
+            <a:r>
+              <a:rPr lang="en-US" i="1" dirty="0" smtClean="0"/>
+              <a:t>	minimum voltage</a:t>
+            </a:r>
+            <a:r>
+              <a:rPr lang="en-US" dirty="0" smtClean="0"/>
+              <a:t> (</a:t>
+            </a:r>
+            <a:r>
+              <a:rPr lang="en-US" i="1" dirty="0" err="1" smtClean="0"/>
+              <a:t>V</a:t>
+            </a:r>
+            <a:r>
+              <a:rPr lang="en-US" i="1" baseline="-25000" dirty="0" err="1" smtClean="0"/>
+              <a:t>min</a:t>
+            </a:r>
+            <a:r>
+              <a:rPr lang="en-US" dirty="0" smtClean="0"/>
+              <a:t>) is the lowest voltage measured associated 	with that regulator.  It could be the load side of the regulator 	(</a:t>
+            </a:r>
+            <a:r>
+              <a:rPr lang="en-US" i="1" dirty="0" smtClean="0"/>
+              <a:t>regulator load-side voltage </a:t>
+            </a:r>
+            <a:r>
+              <a:rPr lang="en-US" dirty="0" smtClean="0"/>
+              <a:t>(</a:t>
+            </a:r>
+            <a:r>
+              <a:rPr lang="en-US" i="1" dirty="0" err="1" smtClean="0"/>
+              <a:t>V</a:t>
+            </a:r>
+            <a:r>
+              <a:rPr lang="en-US" i="1" baseline="-25000" dirty="0" err="1" smtClean="0"/>
+              <a:t>reg_load</a:t>
+            </a:r>
+            <a:r>
+              <a:rPr lang="en-US" dirty="0" smtClean="0"/>
+              <a:t>)) or an end-of-line measurement 	(</a:t>
+            </a:r>
+            <a:r>
+              <a:rPr lang="en-US" i="1" dirty="0" smtClean="0"/>
+              <a:t>V</a:t>
+            </a:r>
+            <a:r>
+              <a:rPr lang="en-US" i="1" baseline="-25000" dirty="0" smtClean="0"/>
+              <a:t>EOL</a:t>
+            </a:r>
+            <a:r>
+              <a:rPr lang="en-US" dirty="0" smtClean="0"/>
+              <a:t>).</a:t>
+            </a:r>
+            <a:endParaRPr lang="en-US" i="1" dirty="0" smtClean="0"/>
+          </a:p>
+          <a:p>
+            <a:pPr marL="514350" indent="-514350">
               <a:buFont typeface="+mj-lt"/>
               <a:buAutoNum type="arabicPeriod"/>
             </a:pPr>
             <a:r>
               <a:rPr lang="en-US" dirty="0" smtClean="0"/>
-              <a:t>Determine “state of the system”</a:t>
-            </a:r>
-          </a:p>
-          <a:p>
-            <a:pPr marL="971550" lvl="1" indent="-514350">
+              <a:t>Compute </a:t>
+            </a:r>
+            <a:r>
+              <a:rPr lang="en-US" i="1" dirty="0" smtClean="0"/>
+              <a:t>voltage drop </a:t>
+            </a:r>
+            <a:r>
+              <a:rPr lang="en-US" dirty="0" smtClean="0"/>
+              <a:t>(</a:t>
+            </a:r>
+            <a:r>
+              <a:rPr lang="en-US" i="1" dirty="0" err="1" smtClean="0"/>
+              <a:t>V</a:t>
+            </a:r>
+            <a:r>
+              <a:rPr lang="en-US" i="1" baseline="-25000" dirty="0" err="1" smtClean="0"/>
+              <a:t>drop</a:t>
+            </a:r>
+            <a:r>
+              <a:rPr lang="en-US" dirty="0" smtClean="0"/>
+              <a:t>) between regulator and </a:t>
+            </a:r>
+            <a:r>
+              <a:rPr lang="en-US" i="1" dirty="0" smtClean="0"/>
+              <a:t>minimum voltage</a:t>
+            </a:r>
+          </a:p>
+          <a:p>
+            <a:pPr marL="514350" indent="-514350">
               <a:buFont typeface="+mj-lt"/>
               <a:buAutoNum type="arabicPeriod"/>
             </a:pPr>
-            <a:r>
-              <a:rPr lang="en-US" dirty="0" smtClean="0"/>
-              <a:t>Command regulators</a:t>
-            </a:r>
-          </a:p>
-          <a:p>
-            <a:endParaRPr lang="en-US" dirty="0" smtClean="0"/>
-          </a:p>
-          <a:p>
-            <a:r>
-              <a:rPr lang="en-US" dirty="0" smtClean="0"/>
-              <a:t>Stage 2: Reactive Power Optimization Objectives</a:t>
-            </a:r>
-            <a:endParaRPr lang="en-US" dirty="0"/>
-          </a:p>
-          <a:p>
-            <a:pPr marL="971550" lvl="1" indent="-514350">
+            <a:endParaRPr lang="en-US" i="1" dirty="0" smtClean="0"/>
+          </a:p>
+          <a:p>
+            <a:pPr marL="514350" indent="-514350">
               <a:buFont typeface="+mj-lt"/>
               <a:buAutoNum type="arabicPeriod"/>
             </a:pPr>
             <a:r>
               <a:rPr lang="en-US" dirty="0" smtClean="0"/>
-              <a:t>Determine reactive power value</a:t>
-            </a:r>
-          </a:p>
-          <a:p>
-            <a:pPr marL="971550" lvl="1" indent="-514350">
+              <a:t>Apply </a:t>
+            </a:r>
+            <a:r>
+              <a:rPr lang="en-US" i="1" dirty="0" smtClean="0"/>
+              <a:t>voltage drop</a:t>
+            </a:r>
+            <a:r>
+              <a:rPr lang="en-US" dirty="0" smtClean="0"/>
+              <a:t> to </a:t>
+            </a:r>
+            <a:r>
+              <a:rPr lang="en-US" i="1" dirty="0" smtClean="0"/>
+              <a:t>desired voltage </a:t>
+            </a:r>
+            <a:r>
+              <a:rPr lang="en-US" dirty="0" smtClean="0"/>
+              <a:t>(</a:t>
+            </a:r>
+            <a:r>
+              <a:rPr lang="en-US" i="1" dirty="0" err="1" smtClean="0"/>
+              <a:t>V</a:t>
+            </a:r>
+            <a:r>
+              <a:rPr lang="en-US" i="1" baseline="-25000" dirty="0" err="1" smtClean="0"/>
+              <a:t>des</a:t>
+            </a:r>
+            <a:r>
+              <a:rPr lang="en-US" dirty="0" smtClean="0"/>
+              <a:t>) to obtain </a:t>
+            </a:r>
+            <a:r>
+              <a:rPr lang="en-US" i="1" dirty="0" smtClean="0"/>
+              <a:t>corrected desired voltage </a:t>
+            </a:r>
+            <a:r>
+              <a:rPr lang="en-US" dirty="0" smtClean="0"/>
+              <a:t>(</a:t>
+            </a:r>
+            <a:r>
+              <a:rPr lang="en-US" i="1" dirty="0" err="1" smtClean="0"/>
+              <a:t>V</a:t>
+            </a:r>
+            <a:r>
+              <a:rPr lang="en-US" i="1" baseline="-25000" dirty="0" err="1" smtClean="0"/>
+              <a:t>corr_des</a:t>
+            </a:r>
+            <a:r>
+              <a:rPr lang="en-US" dirty="0" smtClean="0"/>
+              <a:t>)</a:t>
+            </a:r>
+            <a:endParaRPr lang="en-US" dirty="0"/>
+          </a:p>
+          <a:p>
+            <a:pPr marL="514350" indent="-514350">
               <a:buFont typeface="+mj-lt"/>
               <a:buAutoNum type="arabicPeriod"/>
             </a:pPr>
-            <a:r>
-              <a:rPr lang="en-US" dirty="0" smtClean="0"/>
-              <a:t>Find next capacitor to switch</a:t>
-            </a:r>
-            <a:endParaRPr lang="en-US" dirty="0"/>
+            <a:endParaRPr lang="en-US" dirty="0" smtClean="0"/>
           </a:p>
         </p:txBody>
       </p:sp>
@@ -4315,297 +4462,6 @@
               <a:rPr lang="en-US" smtClean="0"/>
               <a:pPr/>
               <a:t>13</a:t>
-            </a:fld>
-            <a:endParaRPr lang="en-US"/>
-          </a:p>
-        </p:txBody>
-      </p:sp>
-    </p:spTree>
-    <p:extLst>
-      <p:ext uri="{BB962C8B-B14F-4D97-AF65-F5344CB8AC3E}">
-        <p14:creationId xmlns:p14="http://schemas.microsoft.com/office/powerpoint/2010/main" val="483121065"/>
-      </p:ext>
-    </p:extLst>
-  </p:cSld>
-  <p:clrMapOvr>
-    <a:masterClrMapping/>
-  </p:clrMapOvr>
-  <p:timing>
-    <p:tnLst>
-      <p:par>
-        <p:cTn id="1" dur="indefinite" restart="never" nodeType="tmRoot"/>
-      </p:par>
-    </p:tnLst>
-  </p:timing>
-</p:sld>
-</file>
-
-<file path=ppt/slides/slide14.xml><?xml version="1.0" encoding="utf-8"?>
-<p:sld xmlns:a="http://schemas.openxmlformats.org/drawingml/2006/main" xmlns:r="http://schemas.openxmlformats.org/officeDocument/2006/relationships" xmlns:p="http://schemas.openxmlformats.org/presentationml/2006/main">
-  <p:cSld>
-    <p:spTree>
-      <p:nvGrpSpPr>
-        <p:cNvPr id="1" name=""/>
-        <p:cNvGrpSpPr/>
-        <p:nvPr/>
-      </p:nvGrpSpPr>
-      <p:grpSpPr>
-        <a:xfrm>
-          <a:off x="0" y="0"/>
-          <a:ext cx="0" cy="0"/>
-          <a:chOff x="0" y="0"/>
-          <a:chExt cx="0" cy="0"/>
-        </a:xfrm>
-      </p:grpSpPr>
-      <p:sp>
-        <p:nvSpPr>
-          <p:cNvPr id="2" name="Title 1"/>
-          <p:cNvSpPr>
-            <a:spLocks noGrp="1"/>
-          </p:cNvSpPr>
-          <p:nvPr>
-            <p:ph type="title"/>
-          </p:nvPr>
-        </p:nvSpPr>
-        <p:spPr/>
-        <p:txBody>
-          <a:bodyPr>
-            <a:normAutofit/>
-          </a:bodyPr>
-          <a:lstStyle/>
-          <a:p>
-            <a:r>
-              <a:rPr lang="en-US" dirty="0" smtClean="0"/>
-              <a:t>VVO-Regulators – Voltage Optimization</a:t>
-            </a:r>
-            <a:endParaRPr lang="en-US" dirty="0"/>
-          </a:p>
-        </p:txBody>
-      </p:sp>
-      <p:sp>
-        <p:nvSpPr>
-          <p:cNvPr id="3" name="Content Placeholder 2"/>
-          <p:cNvSpPr>
-            <a:spLocks noGrp="1"/>
-          </p:cNvSpPr>
-          <p:nvPr>
-            <p:ph idx="1"/>
-          </p:nvPr>
-        </p:nvSpPr>
-        <p:spPr/>
-        <p:txBody>
-          <a:bodyPr>
-            <a:normAutofit/>
-          </a:bodyPr>
-          <a:lstStyle/>
-          <a:p>
-            <a:pPr marL="514350" indent="-514350">
-              <a:buFont typeface="+mj-lt"/>
-              <a:buAutoNum type="arabicPeriod"/>
-            </a:pPr>
-            <a:r>
-              <a:rPr lang="en-US" dirty="0" smtClean="0"/>
-              <a:t>Determine </a:t>
-            </a:r>
-            <a:r>
-              <a:rPr lang="en-US" i="1" dirty="0" smtClean="0"/>
-              <a:t>minimum voltage</a:t>
-            </a:r>
-            <a:r>
-              <a:rPr lang="en-US" dirty="0" smtClean="0"/>
-              <a:t> in measurements and </a:t>
-            </a:r>
-            <a:r>
-              <a:rPr lang="en-US" i="1" dirty="0" smtClean="0"/>
-              <a:t>regulator load-side voltage</a:t>
-            </a:r>
-          </a:p>
-          <a:p>
-            <a:pPr marL="400050" lvl="1" indent="0">
-              <a:buNone/>
-            </a:pPr>
-            <a:r>
-              <a:rPr lang="en-US" i="1" dirty="0" smtClean="0"/>
-              <a:t>	minimum voltage</a:t>
-            </a:r>
-            <a:r>
-              <a:rPr lang="en-US" dirty="0" smtClean="0"/>
-              <a:t> (</a:t>
-            </a:r>
-            <a:r>
-              <a:rPr lang="en-US" i="1" dirty="0" err="1" smtClean="0"/>
-              <a:t>V</a:t>
-            </a:r>
-            <a:r>
-              <a:rPr lang="en-US" i="1" baseline="-25000" dirty="0" err="1" smtClean="0"/>
-              <a:t>min</a:t>
-            </a:r>
-            <a:r>
-              <a:rPr lang="en-US" dirty="0" smtClean="0"/>
-              <a:t>) is the lowest voltage measured associated 	with that regulator.  It could be the load side of the regulator 	(</a:t>
-            </a:r>
-            <a:r>
-              <a:rPr lang="en-US" i="1" dirty="0" smtClean="0"/>
-              <a:t>regulator load-side voltage </a:t>
-            </a:r>
-            <a:r>
-              <a:rPr lang="en-US" dirty="0" smtClean="0"/>
-              <a:t>(</a:t>
-            </a:r>
-            <a:r>
-              <a:rPr lang="en-US" i="1" dirty="0" err="1" smtClean="0"/>
-              <a:t>V</a:t>
-            </a:r>
-            <a:r>
-              <a:rPr lang="en-US" i="1" baseline="-25000" dirty="0" err="1" smtClean="0"/>
-              <a:t>reg_load</a:t>
-            </a:r>
-            <a:r>
-              <a:rPr lang="en-US" dirty="0" smtClean="0"/>
-              <a:t>)) or an end-of-line measurement 	(</a:t>
-            </a:r>
-            <a:r>
-              <a:rPr lang="en-US" i="1" dirty="0" smtClean="0"/>
-              <a:t>V</a:t>
-            </a:r>
-            <a:r>
-              <a:rPr lang="en-US" i="1" baseline="-25000" dirty="0" smtClean="0"/>
-              <a:t>EOL</a:t>
-            </a:r>
-            <a:r>
-              <a:rPr lang="en-US" dirty="0" smtClean="0"/>
-              <a:t>).</a:t>
-            </a:r>
-            <a:endParaRPr lang="en-US" i="1" dirty="0" smtClean="0"/>
-          </a:p>
-          <a:p>
-            <a:pPr marL="514350" indent="-514350">
-              <a:buFont typeface="+mj-lt"/>
-              <a:buAutoNum type="arabicPeriod"/>
-            </a:pPr>
-            <a:r>
-              <a:rPr lang="en-US" dirty="0" smtClean="0"/>
-              <a:t>Compute </a:t>
-            </a:r>
-            <a:r>
-              <a:rPr lang="en-US" i="1" dirty="0" smtClean="0"/>
-              <a:t>voltage drop </a:t>
-            </a:r>
-            <a:r>
-              <a:rPr lang="en-US" dirty="0" smtClean="0"/>
-              <a:t>(</a:t>
-            </a:r>
-            <a:r>
-              <a:rPr lang="en-US" i="1" dirty="0" err="1" smtClean="0"/>
-              <a:t>V</a:t>
-            </a:r>
-            <a:r>
-              <a:rPr lang="en-US" i="1" baseline="-25000" dirty="0" err="1" smtClean="0"/>
-              <a:t>drop</a:t>
-            </a:r>
-            <a:r>
-              <a:rPr lang="en-US" dirty="0" smtClean="0"/>
-              <a:t>) between regulator and </a:t>
-            </a:r>
-            <a:r>
-              <a:rPr lang="en-US" i="1" dirty="0" smtClean="0"/>
-              <a:t>minimum voltage</a:t>
-            </a:r>
-          </a:p>
-          <a:p>
-            <a:pPr marL="514350" indent="-514350">
-              <a:buFont typeface="+mj-lt"/>
-              <a:buAutoNum type="arabicPeriod"/>
-            </a:pPr>
-            <a:endParaRPr lang="en-US" i="1" dirty="0" smtClean="0"/>
-          </a:p>
-          <a:p>
-            <a:pPr marL="514350" indent="-514350">
-              <a:buFont typeface="+mj-lt"/>
-              <a:buAutoNum type="arabicPeriod"/>
-            </a:pPr>
-            <a:r>
-              <a:rPr lang="en-US" dirty="0" smtClean="0"/>
-              <a:t>Apply </a:t>
-            </a:r>
-            <a:r>
-              <a:rPr lang="en-US" i="1" dirty="0" smtClean="0"/>
-              <a:t>voltage drop</a:t>
-            </a:r>
-            <a:r>
-              <a:rPr lang="en-US" dirty="0" smtClean="0"/>
-              <a:t> to </a:t>
-            </a:r>
-            <a:r>
-              <a:rPr lang="en-US" i="1" dirty="0" smtClean="0"/>
-              <a:t>desired voltage </a:t>
-            </a:r>
-            <a:r>
-              <a:rPr lang="en-US" dirty="0" smtClean="0"/>
-              <a:t>(</a:t>
-            </a:r>
-            <a:r>
-              <a:rPr lang="en-US" i="1" dirty="0" err="1" smtClean="0"/>
-              <a:t>V</a:t>
-            </a:r>
-            <a:r>
-              <a:rPr lang="en-US" i="1" baseline="-25000" dirty="0" err="1" smtClean="0"/>
-              <a:t>des</a:t>
-            </a:r>
-            <a:r>
-              <a:rPr lang="en-US" dirty="0" smtClean="0"/>
-              <a:t>) to obtain </a:t>
-            </a:r>
-            <a:r>
-              <a:rPr lang="en-US" i="1" dirty="0" smtClean="0"/>
-              <a:t>corrected desired voltage </a:t>
-            </a:r>
-            <a:r>
-              <a:rPr lang="en-US" dirty="0" smtClean="0"/>
-              <a:t>(</a:t>
-            </a:r>
-            <a:r>
-              <a:rPr lang="en-US" i="1" dirty="0" err="1" smtClean="0"/>
-              <a:t>V</a:t>
-            </a:r>
-            <a:r>
-              <a:rPr lang="en-US" i="1" baseline="-25000" dirty="0" err="1" smtClean="0"/>
-              <a:t>corr_des</a:t>
-            </a:r>
-            <a:r>
-              <a:rPr lang="en-US" dirty="0" smtClean="0"/>
-              <a:t>)</a:t>
-            </a:r>
-            <a:endParaRPr lang="en-US" dirty="0"/>
-          </a:p>
-          <a:p>
-            <a:pPr marL="514350" indent="-514350">
-              <a:buFont typeface="+mj-lt"/>
-              <a:buAutoNum type="arabicPeriod"/>
-            </a:pPr>
-            <a:endParaRPr lang="en-US" dirty="0" smtClean="0"/>
-          </a:p>
-        </p:txBody>
-      </p:sp>
-      <p:sp>
-        <p:nvSpPr>
-          <p:cNvPr id="4" name="Slide Number Placeholder 3"/>
-          <p:cNvSpPr>
-            <a:spLocks noGrp="1"/>
-          </p:cNvSpPr>
-          <p:nvPr>
-            <p:ph type="sldNum" sz="quarter" idx="12"/>
-          </p:nvPr>
-        </p:nvSpPr>
-        <p:spPr/>
-        <p:txBody>
-          <a:bodyPr/>
-          <a:lstStyle/>
-          <a:p>
-            <a:fld id="{B6F15528-21DE-4FAA-801E-634DDDAF4B2B}" type="slidenum">
-              <a:rPr lang="en-US" smtClean="0"/>
-              <a:pPr/>
-              <a:t>14</a:t>
             </a:fld>
             <a:endParaRPr lang="en-US"/>
           </a:p>
@@ -4633,7 +4489,7 @@
           <a:graphicData uri="http://schemas.openxmlformats.org/presentationml/2006/ole">
             <mc:AlternateContent xmlns:mc="http://schemas.openxmlformats.org/markup-compatibility/2006">
               <mc:Choice xmlns:v="urn:schemas-microsoft-com:vml" Requires="v">
-                <p:oleObj spid="_x0000_s1067" name="Equation" r:id="rId3" imgW="1269720" imgH="241200" progId="Equation.3">
+                <p:oleObj spid="_x0000_s1073" name="Equation" r:id="rId3" imgW="1269720" imgH="241200" progId="Equation.3">
                   <p:embed/>
                 </p:oleObj>
               </mc:Choice>
@@ -4690,7 +4546,7 @@
           <a:graphicData uri="http://schemas.openxmlformats.org/presentationml/2006/ole">
             <mc:AlternateContent xmlns:mc="http://schemas.openxmlformats.org/markup-compatibility/2006">
               <mc:Choice xmlns:v="urn:schemas-microsoft-com:vml" Requires="v">
-                <p:oleObj spid="_x0000_s1068" name="Equation" r:id="rId5" imgW="1244520" imgH="241200" progId="Equation.3">
+                <p:oleObj spid="_x0000_s1074" name="Equation" r:id="rId5" imgW="1244520" imgH="241200" progId="Equation.3">
                   <p:embed/>
                 </p:oleObj>
               </mc:Choice>
@@ -4745,7 +4601,7 @@
 </p:sld>
 </file>
 
-<file path=ppt/slides/slide15.xml><?xml version="1.0" encoding="utf-8"?>
+<file path=ppt/slides/slide14.xml><?xml version="1.0" encoding="utf-8"?>
 <p:sld xmlns:a="http://schemas.openxmlformats.org/drawingml/2006/main" xmlns:r="http://schemas.openxmlformats.org/officeDocument/2006/relationships" xmlns:p="http://schemas.openxmlformats.org/presentationml/2006/main">
   <p:cSld>
     <p:spTree>
@@ -4994,7 +4850,7 @@
             <a:fld id="{B6F15528-21DE-4FAA-801E-634DDDAF4B2B}" type="slidenum">
               <a:rPr lang="en-US" smtClean="0"/>
               <a:pPr/>
-              <a:t>15</a:t>
+              <a:t>14</a:t>
             </a:fld>
             <a:endParaRPr lang="en-US"/>
           </a:p>
@@ -5022,7 +4878,7 @@
           <a:graphicData uri="http://schemas.openxmlformats.org/presentationml/2006/ole">
             <mc:AlternateContent xmlns:mc="http://schemas.openxmlformats.org/markup-compatibility/2006">
               <mc:Choice xmlns:v="urn:schemas-microsoft-com:vml" Requires="v">
-                <p:oleObj spid="_x0000_s2112" name="Equation" r:id="rId3" imgW="1612800" imgH="241200" progId="Equation.3">
+                <p:oleObj spid="_x0000_s2121" name="Equation" r:id="rId3" imgW="1612800" imgH="241200" progId="Equation.3">
                   <p:embed/>
                 </p:oleObj>
               </mc:Choice>
@@ -5079,7 +4935,7 @@
           <a:graphicData uri="http://schemas.openxmlformats.org/presentationml/2006/ole">
             <mc:AlternateContent xmlns:mc="http://schemas.openxmlformats.org/markup-compatibility/2006">
               <mc:Choice xmlns:v="urn:schemas-microsoft-com:vml" Requires="v">
-                <p:oleObj spid="_x0000_s2113" name="Equation" r:id="rId5" imgW="1091880" imgH="241200" progId="Equation.3">
+                <p:oleObj spid="_x0000_s2122" name="Equation" r:id="rId5" imgW="1091880" imgH="241200" progId="Equation.3">
                   <p:embed/>
                 </p:oleObj>
               </mc:Choice>
@@ -5136,7 +4992,7 @@
           <a:graphicData uri="http://schemas.openxmlformats.org/presentationml/2006/ole">
             <mc:AlternateContent xmlns:mc="http://schemas.openxmlformats.org/markup-compatibility/2006">
               <mc:Choice xmlns:v="urn:schemas-microsoft-com:vml" Requires="v">
-                <p:oleObj spid="_x0000_s2114" name="Equation" r:id="rId7" imgW="1091880" imgH="241200" progId="Equation.3">
+                <p:oleObj spid="_x0000_s2123" name="Equation" r:id="rId7" imgW="1091880" imgH="241200" progId="Equation.3">
                   <p:embed/>
                 </p:oleObj>
               </mc:Choice>
@@ -5217,7 +5073,7 @@
 </p:sld>
 </file>
 
-<file path=ppt/slides/slide16.xml><?xml version="1.0" encoding="utf-8"?>
+<file path=ppt/slides/slide15.xml><?xml version="1.0" encoding="utf-8"?>
 <p:sld xmlns:a="http://schemas.openxmlformats.org/drawingml/2006/main" xmlns:r="http://schemas.openxmlformats.org/officeDocument/2006/relationships" xmlns:p="http://schemas.openxmlformats.org/presentationml/2006/main">
   <p:cSld>
     <p:spTree>
@@ -5414,7 +5270,7 @@
             <a:fld id="{B6F15528-21DE-4FAA-801E-634DDDAF4B2B}" type="slidenum">
               <a:rPr lang="en-US" smtClean="0"/>
               <a:pPr/>
-              <a:t>16</a:t>
+              <a:t>15</a:t>
             </a:fld>
             <a:endParaRPr lang="en-US"/>
           </a:p>
@@ -5442,7 +5298,7 @@
           <a:graphicData uri="http://schemas.openxmlformats.org/presentationml/2006/ole">
             <mc:AlternateContent xmlns:mc="http://schemas.openxmlformats.org/markup-compatibility/2006">
               <mc:Choice xmlns:v="urn:schemas-microsoft-com:vml" Requires="v">
-                <p:oleObj spid="_x0000_s3181" name="Equation" r:id="rId3" imgW="1841400" imgH="241200" progId="Equation.3">
+                <p:oleObj spid="_x0000_s3196" name="Equation" r:id="rId3" imgW="1841400" imgH="241200" progId="Equation.3">
                   <p:embed/>
                 </p:oleObj>
               </mc:Choice>
@@ -5499,7 +5355,7 @@
           <a:graphicData uri="http://schemas.openxmlformats.org/presentationml/2006/ole">
             <mc:AlternateContent xmlns:mc="http://schemas.openxmlformats.org/markup-compatibility/2006">
               <mc:Choice xmlns:v="urn:schemas-microsoft-com:vml" Requires="v">
-                <p:oleObj spid="_x0000_s3182" name="Equation" r:id="rId5" imgW="1638000" imgH="241200" progId="Equation.3">
+                <p:oleObj spid="_x0000_s3197" name="Equation" r:id="rId5" imgW="1638000" imgH="241200" progId="Equation.3">
                   <p:embed/>
                 </p:oleObj>
               </mc:Choice>
@@ -5582,7 +5438,7 @@
           <a:graphicData uri="http://schemas.openxmlformats.org/presentationml/2006/ole">
             <mc:AlternateContent xmlns:mc="http://schemas.openxmlformats.org/markup-compatibility/2006">
               <mc:Choice xmlns:v="urn:schemas-microsoft-com:vml" Requires="v">
-                <p:oleObj spid="_x0000_s3183" name="Equation" r:id="rId7" imgW="2984400" imgH="241200" progId="Equation.3">
+                <p:oleObj spid="_x0000_s3198" name="Equation" r:id="rId7" imgW="2984400" imgH="241200" progId="Equation.3">
                   <p:embed/>
                 </p:oleObj>
               </mc:Choice>
@@ -5639,7 +5495,7 @@
           <a:graphicData uri="http://schemas.openxmlformats.org/presentationml/2006/ole">
             <mc:AlternateContent xmlns:mc="http://schemas.openxmlformats.org/markup-compatibility/2006">
               <mc:Choice xmlns:v="urn:schemas-microsoft-com:vml" Requires="v">
-                <p:oleObj spid="_x0000_s3184" name="Equation" r:id="rId9" imgW="3022560" imgH="241200" progId="Equation.3">
+                <p:oleObj spid="_x0000_s3199" name="Equation" r:id="rId9" imgW="3022560" imgH="241200" progId="Equation.3">
                   <p:embed/>
                 </p:oleObj>
               </mc:Choice>
@@ -5722,7 +5578,7 @@
           <a:graphicData uri="http://schemas.openxmlformats.org/presentationml/2006/ole">
             <mc:AlternateContent xmlns:mc="http://schemas.openxmlformats.org/markup-compatibility/2006">
               <mc:Choice xmlns:v="urn:schemas-microsoft-com:vml" Requires="v">
-                <p:oleObj spid="_x0000_s3185" name="Equation" r:id="rId11" imgW="2577960" imgH="241200" progId="Equation.3">
+                <p:oleObj spid="_x0000_s3200" name="Equation" r:id="rId11" imgW="2577960" imgH="241200" progId="Equation.3">
                   <p:embed/>
                 </p:oleObj>
               </mc:Choice>
@@ -5777,6 +5633,170 @@
 </p:sld>
 </file>
 
+<file path=ppt/slides/slide16.xml><?xml version="1.0" encoding="utf-8"?>
+<p:sld xmlns:a="http://schemas.openxmlformats.org/drawingml/2006/main" xmlns:r="http://schemas.openxmlformats.org/officeDocument/2006/relationships" xmlns:p="http://schemas.openxmlformats.org/presentationml/2006/main">
+  <p:cSld>
+    <p:spTree>
+      <p:nvGrpSpPr>
+        <p:cNvPr id="1" name=""/>
+        <p:cNvGrpSpPr/>
+        <p:nvPr/>
+      </p:nvGrpSpPr>
+      <p:grpSpPr>
+        <a:xfrm>
+          <a:off x="0" y="0"/>
+          <a:ext cx="0" cy="0"/>
+          <a:chOff x="0" y="0"/>
+          <a:chExt cx="0" cy="0"/>
+        </a:xfrm>
+      </p:grpSpPr>
+      <p:sp>
+        <p:nvSpPr>
+          <p:cNvPr id="2" name="Title 1"/>
+          <p:cNvSpPr>
+            <a:spLocks noGrp="1"/>
+          </p:cNvSpPr>
+          <p:nvPr>
+            <p:ph type="title"/>
+          </p:nvPr>
+        </p:nvSpPr>
+        <p:spPr/>
+        <p:txBody>
+          <a:bodyPr>
+            <a:normAutofit/>
+          </a:bodyPr>
+          <a:lstStyle/>
+          <a:p>
+            <a:r>
+              <a:rPr lang="en-US" dirty="0" smtClean="0"/>
+              <a:t>VVO-Regulators – Voltage Optimization</a:t>
+            </a:r>
+            <a:endParaRPr lang="en-US" dirty="0"/>
+          </a:p>
+        </p:txBody>
+      </p:sp>
+      <p:sp>
+        <p:nvSpPr>
+          <p:cNvPr id="3" name="Content Placeholder 2"/>
+          <p:cNvSpPr>
+            <a:spLocks noGrp="1"/>
+          </p:cNvSpPr>
+          <p:nvPr>
+            <p:ph idx="1"/>
+          </p:nvPr>
+        </p:nvSpPr>
+        <p:spPr/>
+        <p:txBody>
+          <a:bodyPr>
+            <a:normAutofit/>
+          </a:bodyPr>
+          <a:lstStyle/>
+          <a:p>
+            <a:pPr marL="514350" indent="-514350">
+              <a:buFont typeface="+mj-lt"/>
+              <a:buAutoNum type="arabicPeriod" startAt="8"/>
+            </a:pPr>
+            <a:r>
+              <a:rPr lang="en-US" dirty="0" smtClean="0"/>
+              <a:t>If </a:t>
+            </a:r>
+            <a:r>
+              <a:rPr lang="en-US" i="1" dirty="0" smtClean="0"/>
+              <a:t>new voltage</a:t>
+            </a:r>
+            <a:r>
+              <a:rPr lang="en-US" dirty="0" smtClean="0"/>
+              <a:t> is acceptable, change taps of regulator</a:t>
+            </a:r>
+          </a:p>
+          <a:p>
+            <a:pPr marL="400050" lvl="1" indent="0">
+              <a:buNone/>
+            </a:pPr>
+            <a:r>
+              <a:rPr lang="en-US" dirty="0"/>
+              <a:t>	</a:t>
+            </a:r>
+            <a:r>
+              <a:rPr lang="en-US" dirty="0" smtClean="0"/>
+              <a:t>Tap change is pushed to the regulator directly, not a voltage set point</a:t>
+            </a:r>
+            <a:br>
+              <a:rPr lang="en-US" dirty="0" smtClean="0"/>
+            </a:br>
+            <a:r>
+              <a:rPr lang="en-US" dirty="0" smtClean="0"/>
+              <a:t>	(i.e., the regulator is commanded “tap up”, not “set voltage to 2500”)</a:t>
+            </a:r>
+          </a:p>
+          <a:p>
+            <a:pPr marL="400050" lvl="1" indent="0">
+              <a:buNone/>
+            </a:pPr>
+            <a:endParaRPr lang="en-US" dirty="0"/>
+          </a:p>
+          <a:p>
+            <a:pPr marL="400050" lvl="1" indent="0">
+              <a:buNone/>
+            </a:pPr>
+            <a:r>
+              <a:rPr lang="en-US" dirty="0" smtClean="0"/>
+              <a:t>	Downstream regulators are not coordinated, so upstream changes may</a:t>
+            </a:r>
+            <a:br>
+              <a:rPr lang="en-US" dirty="0" smtClean="0"/>
+            </a:br>
+            <a:r>
+              <a:rPr lang="en-US" dirty="0" smtClean="0"/>
+              <a:t>	move them into a voltage violation</a:t>
+            </a:r>
+          </a:p>
+        </p:txBody>
+      </p:sp>
+      <p:sp>
+        <p:nvSpPr>
+          <p:cNvPr id="4" name="Slide Number Placeholder 3"/>
+          <p:cNvSpPr>
+            <a:spLocks noGrp="1"/>
+          </p:cNvSpPr>
+          <p:nvPr>
+            <p:ph type="sldNum" sz="quarter" idx="12"/>
+          </p:nvPr>
+        </p:nvSpPr>
+        <p:spPr/>
+        <p:txBody>
+          <a:bodyPr/>
+          <a:lstStyle/>
+          <a:p>
+            <a:fld id="{B6F15528-21DE-4FAA-801E-634DDDAF4B2B}" type="slidenum">
+              <a:rPr lang="en-US" smtClean="0"/>
+              <a:pPr/>
+              <a:t>16</a:t>
+            </a:fld>
+            <a:endParaRPr lang="en-US"/>
+          </a:p>
+        </p:txBody>
+      </p:sp>
+    </p:spTree>
+    <p:extLst>
+      <p:ext uri="{BB962C8B-B14F-4D97-AF65-F5344CB8AC3E}">
+        <p14:creationId xmlns:p14="http://schemas.microsoft.com/office/powerpoint/2010/main" val="3612236639"/>
+      </p:ext>
+    </p:extLst>
+  </p:cSld>
+  <p:clrMapOvr>
+    <a:masterClrMapping/>
+  </p:clrMapOvr>
+  <p:timing>
+    <p:tnLst>
+      <p:par>
+        <p:cTn id="1" dur="indefinite" restart="never" nodeType="tmRoot"/>
+      </p:par>
+    </p:tnLst>
+  </p:timing>
+</p:sld>
+</file>
+
 <file path=ppt/slides/slide17.xml><?xml version="1.0" encoding="utf-8"?>
 <p:sld xmlns:a="http://schemas.openxmlformats.org/drawingml/2006/main" xmlns:r="http://schemas.openxmlformats.org/officeDocument/2006/relationships" xmlns:p="http://schemas.openxmlformats.org/presentationml/2006/main">
   <p:cSld>
@@ -5813,7 +5833,7 @@
           <a:p>
             <a:r>
               <a:rPr lang="en-US" dirty="0" smtClean="0"/>
-              <a:t>VVO-Regulators – Voltage Optimization</a:t>
+              <a:t>VVO-Capacitors – Reactive Power Optimization</a:t>
             </a:r>
             <a:endParaRPr lang="en-US" dirty="0"/>
           </a:p>
@@ -5836,22 +5856,102 @@
           </a:bodyPr>
           <a:lstStyle/>
           <a:p>
+            <a:r>
+              <a:rPr lang="en-US" dirty="0" smtClean="0"/>
+              <a:t>Only occurs if no regulator changes are requested</a:t>
+            </a:r>
+          </a:p>
+          <a:p>
             <a:pPr marL="514350" indent="-514350">
               <a:buFont typeface="+mj-lt"/>
-              <a:buAutoNum type="arabicPeriod" startAt="8"/>
+              <a:buAutoNum type="arabicPeriod"/>
             </a:pPr>
             <a:r>
               <a:rPr lang="en-US" dirty="0" smtClean="0"/>
-              <a:t>If </a:t>
+              <a:t>Determine </a:t>
             </a:r>
             <a:r>
               <a:rPr lang="en-US" i="1" dirty="0" smtClean="0"/>
-              <a:t>new voltage</a:t>
+              <a:t>reactive power </a:t>
             </a:r>
             <a:r>
               <a:rPr lang="en-US" dirty="0" smtClean="0"/>
-              <a:t> is acceptable, change taps of regulator</a:t>
-            </a:r>
+              <a:t>(</a:t>
+            </a:r>
+            <a:r>
+              <a:rPr lang="en-US" i="1" dirty="0" err="1" smtClean="0"/>
+              <a:t>Q</a:t>
+            </a:r>
+            <a:r>
+              <a:rPr lang="en-US" i="1" baseline="-25000" dirty="0" err="1" smtClean="0"/>
+              <a:t>line</a:t>
+            </a:r>
+            <a:r>
+              <a:rPr lang="en-US" dirty="0" smtClean="0"/>
+              <a:t>) on line of interest (substation transformer) – compute the current </a:t>
+            </a:r>
+            <a:r>
+              <a:rPr lang="en-US" i="1" dirty="0" smtClean="0"/>
+              <a:t>power factor </a:t>
+            </a:r>
+            <a:r>
+              <a:rPr lang="en-US" dirty="0" smtClean="0"/>
+              <a:t>(</a:t>
+            </a:r>
+            <a:r>
+              <a:rPr lang="en-US" i="1" dirty="0" err="1" smtClean="0"/>
+              <a:t>PF</a:t>
+            </a:r>
+            <a:r>
+              <a:rPr lang="en-US" i="1" baseline="-25000" dirty="0" err="1" smtClean="0"/>
+              <a:t>curr</a:t>
+            </a:r>
+            <a:r>
+              <a:rPr lang="en-US" dirty="0" smtClean="0"/>
+              <a:t>) from the </a:t>
+            </a:r>
+            <a:r>
+              <a:rPr lang="en-US" i="1" dirty="0" smtClean="0"/>
+              <a:t>reactive power</a:t>
+            </a:r>
+            <a:r>
+              <a:rPr lang="en-US" dirty="0" smtClean="0"/>
+              <a:t> and </a:t>
+            </a:r>
+            <a:r>
+              <a:rPr lang="en-US" i="1" dirty="0" smtClean="0"/>
+              <a:t>real power</a:t>
+            </a:r>
+            <a:r>
+              <a:rPr lang="en-US" dirty="0" smtClean="0"/>
+              <a:t> (</a:t>
+            </a:r>
+            <a:r>
+              <a:rPr lang="en-US" i="1" dirty="0" err="1" smtClean="0"/>
+              <a:t>P</a:t>
+            </a:r>
+            <a:r>
+              <a:rPr lang="en-US" i="1" baseline="-25000" dirty="0" err="1" smtClean="0"/>
+              <a:t>line</a:t>
+            </a:r>
+            <a:r>
+              <a:rPr lang="en-US" dirty="0" smtClean="0"/>
+              <a:t>) of the line</a:t>
+            </a:r>
+          </a:p>
+          <a:p>
+            <a:pPr marL="514350" indent="-514350">
+              <a:buFont typeface="+mj-lt"/>
+              <a:buAutoNum type="arabicPeriod"/>
+            </a:pPr>
+            <a:endParaRPr lang="en-US" dirty="0" smtClean="0"/>
+          </a:p>
+          <a:p>
+            <a:pPr marL="514350" indent="-514350">
+              <a:buFont typeface="+mj-lt"/>
+              <a:buAutoNum type="arabicPeriod"/>
+            </a:pPr>
+            <a:endParaRPr lang="en-US" dirty="0" smtClean="0"/>
           </a:p>
           <a:p>
             <a:pPr marL="400050" lvl="1" indent="0">
@@ -5863,36 +5963,47 @@
             </a:r>
             <a:r>
               <a:rPr lang="en-US" dirty="0" smtClean="0"/>
-              <a:t>Tap change is pushed to the regulator directly, not a voltage set point</a:t>
-            </a:r>
-            <a:br>
+              <a:t>Note that </a:t>
+            </a:r>
+            <a:r>
+              <a:rPr lang="en-US" i="1" dirty="0" err="1" smtClean="0"/>
+              <a:t>PF</a:t>
+            </a:r>
+            <a:r>
+              <a:rPr lang="en-US" i="1" baseline="-25000" dirty="0" err="1" smtClean="0"/>
+              <a:t>curr</a:t>
+            </a:r>
+            <a:r>
               <a:rPr lang="en-US" dirty="0" smtClean="0"/>
-            </a:br>
+              <a:t> and </a:t>
+            </a:r>
+            <a:r>
+              <a:rPr lang="en-US" i="1" dirty="0" err="1" smtClean="0"/>
+              <a:t>Q</a:t>
+            </a:r>
+            <a:r>
+              <a:rPr lang="en-US" i="1" baseline="-25000" dirty="0" err="1" smtClean="0"/>
+              <a:t>line</a:t>
+            </a:r>
             <a:r>
               <a:rPr lang="en-US" dirty="0" smtClean="0"/>
-              <a:t>	(i.e., the regulator is commanded “tap up”, not “set voltage to 2500”)</a:t>
-            </a:r>
-          </a:p>
-          <a:p>
-            <a:pPr marL="400050" lvl="1" indent="0">
-              <a:buNone/>
-            </a:pPr>
-            <a:endParaRPr lang="en-US" dirty="0"/>
-          </a:p>
-          <a:p>
-            <a:pPr marL="400050" lvl="1" indent="0">
-              <a:buNone/>
-            </a:pPr>
+              <a:t> are treated more like </a:t>
+            </a:r>
+            <a:r>
+              <a:rPr lang="en-US" i="1" dirty="0" smtClean="0"/>
+              <a:t>power factor</a:t>
+            </a:r>
             <a:r>
               <a:rPr lang="en-US" dirty="0" smtClean="0"/>
-              <a:t>	Downstream regulators are not coordinated, so upstream changes may</a:t>
-            </a:r>
-            <a:br>
+              <a:t> 	magnitude and </a:t>
+            </a:r>
+            <a:r>
+              <a:rPr lang="en-US" i="1" dirty="0" smtClean="0"/>
+              <a:t>reactive power</a:t>
+            </a:r>
+            <a:r>
               <a:rPr lang="en-US" dirty="0" smtClean="0"/>
-            </a:br>
-            <a:r>
-              <a:rPr lang="en-US" dirty="0" smtClean="0"/>
-              <a:t>	move them into a voltage violation</a:t>
+              <a:t> magnitude.  The VVO algorithm 	assumes normal radial feeders with predominately inductive loading 	(no predominately capacitive loads or reverse power flow)</a:t>
             </a:r>
           </a:p>
         </p:txBody>
@@ -5916,261 +6027,6 @@
               <a:rPr lang="en-US" smtClean="0"/>
               <a:pPr/>
               <a:t>17</a:t>
-            </a:fld>
-            <a:endParaRPr lang="en-US"/>
-          </a:p>
-        </p:txBody>
-      </p:sp>
-    </p:spTree>
-    <p:extLst>
-      <p:ext uri="{BB962C8B-B14F-4D97-AF65-F5344CB8AC3E}">
-        <p14:creationId xmlns:p14="http://schemas.microsoft.com/office/powerpoint/2010/main" val="3612236639"/>
-      </p:ext>
-    </p:extLst>
-  </p:cSld>
-  <p:clrMapOvr>
-    <a:masterClrMapping/>
-  </p:clrMapOvr>
-  <p:timing>
-    <p:tnLst>
-      <p:par>
-        <p:cTn id="1" dur="indefinite" restart="never" nodeType="tmRoot"/>
-      </p:par>
-    </p:tnLst>
-  </p:timing>
-</p:sld>
-</file>
-
-<file path=ppt/slides/slide18.xml><?xml version="1.0" encoding="utf-8"?>
-<p:sld xmlns:a="http://schemas.openxmlformats.org/drawingml/2006/main" xmlns:r="http://schemas.openxmlformats.org/officeDocument/2006/relationships" xmlns:p="http://schemas.openxmlformats.org/presentationml/2006/main">
-  <p:cSld>
-    <p:spTree>
-      <p:nvGrpSpPr>
-        <p:cNvPr id="1" name=""/>
-        <p:cNvGrpSpPr/>
-        <p:nvPr/>
-      </p:nvGrpSpPr>
-      <p:grpSpPr>
-        <a:xfrm>
-          <a:off x="0" y="0"/>
-          <a:ext cx="0" cy="0"/>
-          <a:chOff x="0" y="0"/>
-          <a:chExt cx="0" cy="0"/>
-        </a:xfrm>
-      </p:grpSpPr>
-      <p:sp>
-        <p:nvSpPr>
-          <p:cNvPr id="2" name="Title 1"/>
-          <p:cNvSpPr>
-            <a:spLocks noGrp="1"/>
-          </p:cNvSpPr>
-          <p:nvPr>
-            <p:ph type="title"/>
-          </p:nvPr>
-        </p:nvSpPr>
-        <p:spPr/>
-        <p:txBody>
-          <a:bodyPr>
-            <a:normAutofit/>
-          </a:bodyPr>
-          <a:lstStyle/>
-          <a:p>
-            <a:r>
-              <a:rPr lang="en-US" dirty="0" smtClean="0"/>
-              <a:t>VVO-Capacitors – Reactive Power Optimization</a:t>
-            </a:r>
-            <a:endParaRPr lang="en-US" dirty="0"/>
-          </a:p>
-        </p:txBody>
-      </p:sp>
-      <p:sp>
-        <p:nvSpPr>
-          <p:cNvPr id="3" name="Content Placeholder 2"/>
-          <p:cNvSpPr>
-            <a:spLocks noGrp="1"/>
-          </p:cNvSpPr>
-          <p:nvPr>
-            <p:ph idx="1"/>
-          </p:nvPr>
-        </p:nvSpPr>
-        <p:spPr/>
-        <p:txBody>
-          <a:bodyPr>
-            <a:normAutofit/>
-          </a:bodyPr>
-          <a:lstStyle/>
-          <a:p>
-            <a:r>
-              <a:rPr lang="en-US" dirty="0" smtClean="0"/>
-              <a:t>Only occurs if no regulator changes are requested</a:t>
-            </a:r>
-          </a:p>
-          <a:p>
-            <a:pPr marL="514350" indent="-514350">
-              <a:buFont typeface="+mj-lt"/>
-              <a:buAutoNum type="arabicPeriod"/>
-            </a:pPr>
-            <a:r>
-              <a:rPr lang="en-US" dirty="0" smtClean="0"/>
-              <a:t>Determine </a:t>
-            </a:r>
-            <a:r>
-              <a:rPr lang="en-US" i="1" dirty="0" smtClean="0"/>
-              <a:t>reactive power </a:t>
-            </a:r>
-            <a:r>
-              <a:rPr lang="en-US" dirty="0" smtClean="0"/>
-              <a:t>(</a:t>
-            </a:r>
-            <a:r>
-              <a:rPr lang="en-US" i="1" dirty="0" err="1" smtClean="0"/>
-              <a:t>Q</a:t>
-            </a:r>
-            <a:r>
-              <a:rPr lang="en-US" i="1" baseline="-25000" dirty="0" err="1" smtClean="0"/>
-              <a:t>line</a:t>
-            </a:r>
-            <a:r>
-              <a:rPr lang="en-US" dirty="0" smtClean="0"/>
-              <a:t>) on line of interest (substation transformer) – compute the current </a:t>
-            </a:r>
-            <a:r>
-              <a:rPr lang="en-US" i="1" dirty="0" smtClean="0"/>
-              <a:t>power factor </a:t>
-            </a:r>
-            <a:r>
-              <a:rPr lang="en-US" dirty="0" smtClean="0"/>
-              <a:t>(</a:t>
-            </a:r>
-            <a:r>
-              <a:rPr lang="en-US" i="1" dirty="0" err="1" smtClean="0"/>
-              <a:t>PF</a:t>
-            </a:r>
-            <a:r>
-              <a:rPr lang="en-US" i="1" baseline="-25000" dirty="0" err="1" smtClean="0"/>
-              <a:t>curr</a:t>
-            </a:r>
-            <a:r>
-              <a:rPr lang="en-US" dirty="0" smtClean="0"/>
-              <a:t>) from the </a:t>
-            </a:r>
-            <a:r>
-              <a:rPr lang="en-US" i="1" dirty="0" smtClean="0"/>
-              <a:t>reactive power</a:t>
-            </a:r>
-            <a:r>
-              <a:rPr lang="en-US" dirty="0" smtClean="0"/>
-              <a:t> and </a:t>
-            </a:r>
-            <a:r>
-              <a:rPr lang="en-US" i="1" dirty="0" smtClean="0"/>
-              <a:t>real power</a:t>
-            </a:r>
-            <a:r>
-              <a:rPr lang="en-US" dirty="0" smtClean="0"/>
-              <a:t> (</a:t>
-            </a:r>
-            <a:r>
-              <a:rPr lang="en-US" i="1" dirty="0" err="1" smtClean="0"/>
-              <a:t>P</a:t>
-            </a:r>
-            <a:r>
-              <a:rPr lang="en-US" i="1" baseline="-25000" dirty="0" err="1" smtClean="0"/>
-              <a:t>line</a:t>
-            </a:r>
-            <a:r>
-              <a:rPr lang="en-US" dirty="0" smtClean="0"/>
-              <a:t>) of the line</a:t>
-            </a:r>
-          </a:p>
-          <a:p>
-            <a:pPr marL="514350" indent="-514350">
-              <a:buFont typeface="+mj-lt"/>
-              <a:buAutoNum type="arabicPeriod"/>
-            </a:pPr>
-            <a:endParaRPr lang="en-US" dirty="0" smtClean="0"/>
-          </a:p>
-          <a:p>
-            <a:pPr marL="514350" indent="-514350">
-              <a:buFont typeface="+mj-lt"/>
-              <a:buAutoNum type="arabicPeriod"/>
-            </a:pPr>
-            <a:endParaRPr lang="en-US" dirty="0" smtClean="0"/>
-          </a:p>
-          <a:p>
-            <a:pPr marL="400050" lvl="1" indent="0">
-              <a:buNone/>
-            </a:pPr>
-            <a:r>
-              <a:rPr lang="en-US" dirty="0"/>
-              <a:t>	</a:t>
-            </a:r>
-            <a:r>
-              <a:rPr lang="en-US" dirty="0" smtClean="0"/>
-              <a:t>Note that </a:t>
-            </a:r>
-            <a:r>
-              <a:rPr lang="en-US" i="1" dirty="0" err="1" smtClean="0"/>
-              <a:t>PF</a:t>
-            </a:r>
-            <a:r>
-              <a:rPr lang="en-US" i="1" baseline="-25000" dirty="0" err="1" smtClean="0"/>
-              <a:t>curr</a:t>
-            </a:r>
-            <a:r>
-              <a:rPr lang="en-US" dirty="0" smtClean="0"/>
-              <a:t> and </a:t>
-            </a:r>
-            <a:r>
-              <a:rPr lang="en-US" i="1" dirty="0" err="1" smtClean="0"/>
-              <a:t>Q</a:t>
-            </a:r>
-            <a:r>
-              <a:rPr lang="en-US" i="1" baseline="-25000" dirty="0" err="1" smtClean="0"/>
-              <a:t>line</a:t>
-            </a:r>
-            <a:r>
-              <a:rPr lang="en-US" dirty="0" smtClean="0"/>
-              <a:t> are treated more like </a:t>
-            </a:r>
-            <a:r>
-              <a:rPr lang="en-US" i="1" dirty="0" smtClean="0"/>
-              <a:t>power factor</a:t>
-            </a:r>
-            <a:r>
-              <a:rPr lang="en-US" dirty="0" smtClean="0"/>
-              <a:t> 	magnitude and </a:t>
-            </a:r>
-            <a:r>
-              <a:rPr lang="en-US" i="1" dirty="0" smtClean="0"/>
-              <a:t>reactive power</a:t>
-            </a:r>
-            <a:r>
-              <a:rPr lang="en-US" dirty="0" smtClean="0"/>
-              <a:t> magnitude.  The VVO algorithm 	assumes normal radial feeders with predominately inductive loading 	(no predominately capacitive loads or reverse power flow)</a:t>
-            </a:r>
-          </a:p>
-        </p:txBody>
-      </p:sp>
-      <p:sp>
-        <p:nvSpPr>
-          <p:cNvPr id="4" name="Slide Number Placeholder 3"/>
-          <p:cNvSpPr>
-            <a:spLocks noGrp="1"/>
-          </p:cNvSpPr>
-          <p:nvPr>
-            <p:ph type="sldNum" sz="quarter" idx="12"/>
-          </p:nvPr>
-        </p:nvSpPr>
-        <p:spPr/>
-        <p:txBody>
-          <a:bodyPr/>
-          <a:lstStyle/>
-          <a:p>
-            <a:fld id="{B6F15528-21DE-4FAA-801E-634DDDAF4B2B}" type="slidenum">
-              <a:rPr lang="en-US" smtClean="0"/>
-              <a:pPr/>
-              <a:t>18</a:t>
             </a:fld>
             <a:endParaRPr lang="en-US"/>
           </a:p>
@@ -6198,7 +6054,7 @@
           <a:graphicData uri="http://schemas.openxmlformats.org/presentationml/2006/ole">
             <mc:AlternateContent xmlns:mc="http://schemas.openxmlformats.org/markup-compatibility/2006">
               <mc:Choice xmlns:v="urn:schemas-microsoft-com:vml" Requires="v">
-                <p:oleObj spid="_x0000_s5140" name="Equation" r:id="rId3" imgW="1307880" imgH="469800" progId="Equation.3">
+                <p:oleObj spid="_x0000_s5143" name="Equation" r:id="rId3" imgW="1307880" imgH="469800" progId="Equation.3">
                   <p:embed/>
                 </p:oleObj>
               </mc:Choice>
@@ -6253,7 +6109,7 @@
 </p:sld>
 </file>
 
-<file path=ppt/slides/slide19.xml><?xml version="1.0" encoding="utf-8"?>
+<file path=ppt/slides/slide18.xml><?xml version="1.0" encoding="utf-8"?>
 <p:sld xmlns:a="http://schemas.openxmlformats.org/drawingml/2006/main" xmlns:r="http://schemas.openxmlformats.org/officeDocument/2006/relationships" xmlns:p="http://schemas.openxmlformats.org/presentationml/2006/main">
   <p:cSld>
     <p:spTree>
@@ -6495,7 +6351,7 @@
             <a:fld id="{B6F15528-21DE-4FAA-801E-634DDDAF4B2B}" type="slidenum">
               <a:rPr lang="en-US" smtClean="0"/>
               <a:pPr/>
-              <a:t>19</a:t>
+              <a:t>18</a:t>
             </a:fld>
             <a:endParaRPr lang="en-US" dirty="0"/>
           </a:p>
@@ -6523,7 +6379,7 @@
           <a:graphicData uri="http://schemas.openxmlformats.org/presentationml/2006/ole">
             <mc:AlternateContent xmlns:mc="http://schemas.openxmlformats.org/markup-compatibility/2006">
               <mc:Choice xmlns:v="urn:schemas-microsoft-com:vml" Requires="v">
-                <p:oleObj spid="_x0000_s6205" name="Equation" r:id="rId3" imgW="850680" imgH="228600" progId="Equation.3">
+                <p:oleObj spid="_x0000_s6217" name="Equation" r:id="rId3" imgW="850680" imgH="228600" progId="Equation.3">
                   <p:embed/>
                 </p:oleObj>
               </mc:Choice>
@@ -6580,7 +6436,7 @@
           <a:graphicData uri="http://schemas.openxmlformats.org/presentationml/2006/ole">
             <mc:AlternateContent xmlns:mc="http://schemas.openxmlformats.org/markup-compatibility/2006">
               <mc:Choice xmlns:v="urn:schemas-microsoft-com:vml" Requires="v">
-                <p:oleObj spid="_x0000_s6206" name="Equation" r:id="rId5" imgW="1193760" imgH="241200" progId="Equation.3">
+                <p:oleObj spid="_x0000_s6218" name="Equation" r:id="rId5" imgW="1193760" imgH="241200" progId="Equation.3">
                   <p:embed/>
                 </p:oleObj>
               </mc:Choice>
@@ -6637,7 +6493,7 @@
           <a:graphicData uri="http://schemas.openxmlformats.org/presentationml/2006/ole">
             <mc:AlternateContent xmlns:mc="http://schemas.openxmlformats.org/markup-compatibility/2006">
               <mc:Choice xmlns:v="urn:schemas-microsoft-com:vml" Requires="v">
-                <p:oleObj spid="_x0000_s6207" name="Equation" r:id="rId7" imgW="1180800" imgH="241200" progId="Equation.3">
+                <p:oleObj spid="_x0000_s6219" name="Equation" r:id="rId7" imgW="1180800" imgH="241200" progId="Equation.3">
                   <p:embed/>
                 </p:oleObj>
               </mc:Choice>
@@ -6720,7 +6576,7 @@
           <a:graphicData uri="http://schemas.openxmlformats.org/presentationml/2006/ole">
             <mc:AlternateContent xmlns:mc="http://schemas.openxmlformats.org/markup-compatibility/2006">
               <mc:Choice xmlns:v="urn:schemas-microsoft-com:vml" Requires="v">
-                <p:oleObj spid="_x0000_s6208" name="Equation" r:id="rId9" imgW="1346040" imgH="228600" progId="Equation.3">
+                <p:oleObj spid="_x0000_s6220" name="Equation" r:id="rId9" imgW="1346040" imgH="228600" progId="Equation.3">
                   <p:embed/>
                 </p:oleObj>
               </mc:Choice>
@@ -6759,6 +6615,380 @@
     <p:extLst>
       <p:ext uri="{BB962C8B-B14F-4D97-AF65-F5344CB8AC3E}">
         <p14:creationId xmlns:p14="http://schemas.microsoft.com/office/powerpoint/2010/main" val="3951161820"/>
+      </p:ext>
+    </p:extLst>
+  </p:cSld>
+  <p:clrMapOvr>
+    <a:masterClrMapping/>
+  </p:clrMapOvr>
+  <p:timing>
+    <p:tnLst>
+      <p:par>
+        <p:cTn id="1" dur="indefinite" restart="never" nodeType="tmRoot"/>
+      </p:par>
+    </p:tnLst>
+  </p:timing>
+</p:sld>
+</file>
+
+<file path=ppt/slides/slide19.xml><?xml version="1.0" encoding="utf-8"?>
+<p:sld xmlns:a="http://schemas.openxmlformats.org/drawingml/2006/main" xmlns:r="http://schemas.openxmlformats.org/officeDocument/2006/relationships" xmlns:p="http://schemas.openxmlformats.org/presentationml/2006/main">
+  <p:cSld>
+    <p:spTree>
+      <p:nvGrpSpPr>
+        <p:cNvPr id="1" name=""/>
+        <p:cNvGrpSpPr/>
+        <p:nvPr/>
+      </p:nvGrpSpPr>
+      <p:grpSpPr>
+        <a:xfrm>
+          <a:off x="0" y="0"/>
+          <a:ext cx="0" cy="0"/>
+          <a:chOff x="0" y="0"/>
+          <a:chExt cx="0" cy="0"/>
+        </a:xfrm>
+      </p:grpSpPr>
+      <p:sp>
+        <p:nvSpPr>
+          <p:cNvPr id="2" name="Title 1"/>
+          <p:cNvSpPr>
+            <a:spLocks noGrp="1"/>
+          </p:cNvSpPr>
+          <p:nvPr>
+            <p:ph type="title"/>
+          </p:nvPr>
+        </p:nvSpPr>
+        <p:spPr/>
+        <p:txBody>
+          <a:bodyPr>
+            <a:normAutofit/>
+          </a:bodyPr>
+          <a:lstStyle/>
+          <a:p>
+            <a:r>
+              <a:rPr lang="en-US" dirty="0" smtClean="0"/>
+              <a:t>VVO-Capacitors – Reactive Power Optimization</a:t>
+            </a:r>
+            <a:endParaRPr lang="en-US" dirty="0"/>
+          </a:p>
+        </p:txBody>
+      </p:sp>
+      <p:sp>
+        <p:nvSpPr>
+          <p:cNvPr id="3" name="Content Placeholder 2"/>
+          <p:cNvSpPr>
+            <a:spLocks noGrp="1"/>
+          </p:cNvSpPr>
+          <p:nvPr>
+            <p:ph idx="1"/>
+          </p:nvPr>
+        </p:nvSpPr>
+        <p:spPr/>
+        <p:txBody>
+          <a:bodyPr>
+            <a:normAutofit/>
+          </a:bodyPr>
+          <a:lstStyle/>
+          <a:p>
+            <a:pPr marL="514350" indent="-514350">
+              <a:buFont typeface="+mj-lt"/>
+              <a:buAutoNum type="arabicPeriod" startAt="3"/>
+            </a:pPr>
+            <a:r>
+              <a:rPr lang="en-US" dirty="0" smtClean="0"/>
+              <a:t>If outside range, proceed through capacitors – only change one per operation cycle – dependent on state and size:</a:t>
+            </a:r>
+          </a:p>
+          <a:p>
+            <a:pPr marL="739775" lvl="1" indent="-339725"/>
+            <a:endParaRPr lang="en-US" dirty="0" smtClean="0"/>
+          </a:p>
+          <a:p>
+            <a:pPr marL="739775" lvl="1" indent="-339725"/>
+            <a:r>
+              <a:rPr lang="en-US" i="1" dirty="0" smtClean="0"/>
+              <a:t>ON</a:t>
+            </a:r>
+            <a:r>
+              <a:rPr lang="en-US" dirty="0" smtClean="0"/>
+              <a:t> and</a:t>
+            </a:r>
+            <a:endParaRPr lang="en-US" i="1" baseline="-25000" dirty="0" smtClean="0"/>
+          </a:p>
+          <a:p>
+            <a:pPr marL="400050" lvl="1" indent="0">
+              <a:buNone/>
+            </a:pPr>
+            <a:r>
+              <a:rPr lang="en-US" dirty="0" smtClean="0"/>
+              <a:t>	Capacitor </a:t>
+            </a:r>
+            <a:r>
+              <a:rPr lang="en-US" i="1" dirty="0" smtClean="0"/>
+              <a:t>ON</a:t>
+            </a:r>
+            <a:r>
+              <a:rPr lang="en-US" dirty="0" smtClean="0"/>
+              <a:t> and </a:t>
+            </a:r>
+            <a:r>
+              <a:rPr lang="en-US" i="1" dirty="0" smtClean="0"/>
+              <a:t>reactive power</a:t>
+            </a:r>
+            <a:r>
+              <a:rPr lang="en-US" dirty="0" smtClean="0"/>
+              <a:t> &lt; </a:t>
+            </a:r>
+            <a:r>
+              <a:rPr lang="en-US" i="1" dirty="0" err="1" smtClean="0"/>
+              <a:t>Q</a:t>
+            </a:r>
+            <a:r>
+              <a:rPr lang="en-US" i="1" baseline="-25000" dirty="0" err="1" smtClean="0"/>
+              <a:t>cap_off</a:t>
+            </a:r>
+            <a:r>
+              <a:rPr lang="en-US" dirty="0" smtClean="0"/>
+              <a:t>: switch capacitor to </a:t>
+            </a:r>
+            <a:r>
+              <a:rPr lang="en-US" i="1" dirty="0" smtClean="0"/>
+              <a:t>OFF</a:t>
+            </a:r>
+          </a:p>
+          <a:p>
+            <a:pPr marL="400050" lvl="1" indent="0">
+              <a:buNone/>
+            </a:pPr>
+            <a:endParaRPr lang="en-US" dirty="0" smtClean="0"/>
+          </a:p>
+          <a:p>
+            <a:pPr marL="739775" lvl="1" indent="-339725"/>
+            <a:r>
+              <a:rPr lang="en-US" i="1" dirty="0" smtClean="0"/>
+              <a:t>OFF</a:t>
+            </a:r>
+            <a:r>
+              <a:rPr lang="en-US" dirty="0" smtClean="0"/>
+              <a:t> and</a:t>
+            </a:r>
+            <a:endParaRPr lang="en-US" i="1" baseline="-25000" dirty="0" smtClean="0"/>
+          </a:p>
+          <a:p>
+            <a:pPr marL="800100" lvl="2" indent="0">
+              <a:buNone/>
+            </a:pPr>
+            <a:r>
+              <a:rPr lang="en-US" dirty="0"/>
+              <a:t>	</a:t>
+            </a:r>
+            <a:r>
+              <a:rPr lang="en-US" sz="2000" dirty="0" smtClean="0"/>
+              <a:t>Capacitor </a:t>
+            </a:r>
+            <a:r>
+              <a:rPr lang="en-US" sz="2000" i="1" dirty="0" smtClean="0"/>
+              <a:t>OFF</a:t>
+            </a:r>
+            <a:r>
+              <a:rPr lang="en-US" sz="2000" dirty="0" smtClean="0"/>
+              <a:t> and </a:t>
+            </a:r>
+            <a:r>
+              <a:rPr lang="en-US" sz="2000" i="1" dirty="0" smtClean="0"/>
+              <a:t>reactive power</a:t>
+            </a:r>
+            <a:r>
+              <a:rPr lang="en-US" sz="2000" dirty="0" smtClean="0"/>
+              <a:t> &gt; </a:t>
+            </a:r>
+            <a:r>
+              <a:rPr lang="en-US" sz="2000" i="1" dirty="0" err="1" smtClean="0"/>
+              <a:t>Q</a:t>
+            </a:r>
+            <a:r>
+              <a:rPr lang="en-US" sz="2000" i="1" baseline="-25000" dirty="0" err="1" smtClean="0"/>
+              <a:t>cap_on</a:t>
+            </a:r>
+            <a:r>
+              <a:rPr lang="en-US" sz="2000" dirty="0" smtClean="0"/>
+              <a:t>: switch capacitor to </a:t>
+            </a:r>
+            <a:r>
+              <a:rPr lang="en-US" sz="2000" i="1" dirty="0" smtClean="0"/>
+              <a:t>ON</a:t>
+            </a:r>
+          </a:p>
+          <a:p>
+            <a:pPr marL="800100" lvl="2" indent="0">
+              <a:buNone/>
+            </a:pPr>
+            <a:endParaRPr lang="en-US" sz="2000" dirty="0" smtClean="0"/>
+          </a:p>
+          <a:p>
+            <a:pPr marL="739775" lvl="1" indent="-339725"/>
+            <a:r>
+              <a:rPr lang="en-US" dirty="0" smtClean="0"/>
+              <a:t>Neither met</a:t>
+            </a:r>
+          </a:p>
+          <a:p>
+            <a:pPr marL="800100" lvl="2" indent="0">
+              <a:buNone/>
+            </a:pPr>
+            <a:r>
+              <a:rPr lang="en-US" dirty="0"/>
+              <a:t>	</a:t>
+            </a:r>
+            <a:r>
+              <a:rPr lang="en-US" sz="2000" dirty="0" smtClean="0"/>
+              <a:t>Proceed to next largest capacitor and continue check</a:t>
+            </a:r>
+          </a:p>
+        </p:txBody>
+      </p:sp>
+      <p:sp>
+        <p:nvSpPr>
+          <p:cNvPr id="4" name="Slide Number Placeholder 3"/>
+          <p:cNvSpPr>
+            <a:spLocks noGrp="1"/>
+          </p:cNvSpPr>
+          <p:nvPr>
+            <p:ph type="sldNum" sz="quarter" idx="12"/>
+          </p:nvPr>
+        </p:nvSpPr>
+        <p:spPr/>
+        <p:txBody>
+          <a:bodyPr/>
+          <a:lstStyle/>
+          <a:p>
+            <a:fld id="{B6F15528-21DE-4FAA-801E-634DDDAF4B2B}" type="slidenum">
+              <a:rPr lang="en-US" smtClean="0"/>
+              <a:pPr/>
+              <a:t>19</a:t>
+            </a:fld>
+            <a:endParaRPr lang="en-US"/>
+          </a:p>
+        </p:txBody>
+      </p:sp>
+      <p:graphicFrame>
+        <p:nvGraphicFramePr>
+          <p:cNvPr id="5" name="Object 4"/>
+          <p:cNvGraphicFramePr>
+            <a:graphicFrameLocks noChangeAspect="1"/>
+          </p:cNvGraphicFramePr>
+          <p:nvPr>
+            <p:extLst>
+              <p:ext uri="{D42A27DB-BD31-4B8C-83A1-F6EECF244321}">
+                <p14:modId xmlns:p14="http://schemas.microsoft.com/office/powerpoint/2010/main" val="3880563166"/>
+              </p:ext>
+            </p:extLst>
+          </p:nvPr>
+        </p:nvGraphicFramePr>
+        <p:xfrm>
+          <a:off x="2107473" y="2788887"/>
+          <a:ext cx="1441678" cy="402804"/>
+        </p:xfrm>
+        <a:graphic>
+          <a:graphicData uri="http://schemas.openxmlformats.org/presentationml/2006/ole">
+            <mc:AlternateContent xmlns:mc="http://schemas.openxmlformats.org/markup-compatibility/2006">
+              <mc:Choice xmlns:v="urn:schemas-microsoft-com:vml" Requires="v">
+                <p:oleObj spid="_x0000_s7204" name="Equation" r:id="rId3" imgW="863280" imgH="241200" progId="Equation.3">
+                  <p:embed/>
+                </p:oleObj>
+              </mc:Choice>
+              <mc:Fallback>
+                <p:oleObj name="Equation" r:id="rId3" imgW="863280" imgH="241200" progId="Equation.3">
+                  <p:embed/>
+                  <p:pic>
+                    <p:nvPicPr>
+                      <p:cNvPr id="0" name=""/>
+                      <p:cNvPicPr/>
+                      <p:nvPr/>
+                    </p:nvPicPr>
+                    <p:blipFill>
+                      <a:blip r:embed="rId4"/>
+                      <a:stretch>
+                        <a:fillRect/>
+                      </a:stretch>
+                    </p:blipFill>
+                    <p:spPr>
+                      <a:xfrm>
+                        <a:off x="2107473" y="2788887"/>
+                        <a:ext cx="1441678" cy="402804"/>
+                      </a:xfrm>
+                      <a:prstGeom prst="rect">
+                        <a:avLst/>
+                      </a:prstGeom>
+                    </p:spPr>
+                  </p:pic>
+                </p:oleObj>
+              </mc:Fallback>
+            </mc:AlternateContent>
+          </a:graphicData>
+        </a:graphic>
+      </p:graphicFrame>
+      <p:graphicFrame>
+        <p:nvGraphicFramePr>
+          <p:cNvPr id="6" name="Object 5"/>
+          <p:cNvGraphicFramePr>
+            <a:graphicFrameLocks noChangeAspect="1"/>
+          </p:cNvGraphicFramePr>
+          <p:nvPr>
+            <p:extLst>
+              <p:ext uri="{D42A27DB-BD31-4B8C-83A1-F6EECF244321}">
+                <p14:modId xmlns:p14="http://schemas.microsoft.com/office/powerpoint/2010/main" val="1900855747"/>
+              </p:ext>
+            </p:extLst>
+          </p:nvPr>
+        </p:nvGraphicFramePr>
+        <p:xfrm>
+          <a:off x="2258006" y="3886200"/>
+          <a:ext cx="1399594" cy="402804"/>
+        </p:xfrm>
+        <a:graphic>
+          <a:graphicData uri="http://schemas.openxmlformats.org/presentationml/2006/ole">
+            <mc:AlternateContent xmlns:mc="http://schemas.openxmlformats.org/markup-compatibility/2006">
+              <mc:Choice xmlns:v="urn:schemas-microsoft-com:vml" Requires="v">
+                <p:oleObj spid="_x0000_s7205" name="Equation" r:id="rId5" imgW="838080" imgH="241200" progId="Equation.3">
+                  <p:embed/>
+                </p:oleObj>
+              </mc:Choice>
+              <mc:Fallback>
+                <p:oleObj name="Equation" r:id="rId5" imgW="838080" imgH="241200" progId="Equation.3">
+                  <p:embed/>
+                  <p:pic>
+                    <p:nvPicPr>
+                      <p:cNvPr id="0" name=""/>
+                      <p:cNvPicPr/>
+                      <p:nvPr/>
+                    </p:nvPicPr>
+                    <p:blipFill>
+                      <a:blip r:embed="rId6"/>
+                      <a:stretch>
+                        <a:fillRect/>
+                      </a:stretch>
+                    </p:blipFill>
+                    <p:spPr>
+                      <a:xfrm>
+                        <a:off x="2258006" y="3886200"/>
+                        <a:ext cx="1399594" cy="402804"/>
+                      </a:xfrm>
+                      <a:prstGeom prst="rect">
+                        <a:avLst/>
+                      </a:prstGeom>
+                    </p:spPr>
+                  </p:pic>
+                </p:oleObj>
+              </mc:Fallback>
+            </mc:AlternateContent>
+          </a:graphicData>
+        </a:graphic>
+      </p:graphicFrame>
+    </p:spTree>
+    <p:extLst>
+      <p:ext uri="{BB962C8B-B14F-4D97-AF65-F5344CB8AC3E}">
+        <p14:creationId xmlns:p14="http://schemas.microsoft.com/office/powerpoint/2010/main" val="393414313"/>
       </p:ext>
     </p:extLst>
   </p:cSld>
@@ -6945,380 +7175,6 @@
         </p:nvSpPr>
         <p:spPr/>
         <p:txBody>
-          <a:bodyPr>
-            <a:normAutofit/>
-          </a:bodyPr>
-          <a:lstStyle/>
-          <a:p>
-            <a:r>
-              <a:rPr lang="en-US" dirty="0" smtClean="0"/>
-              <a:t>VVO-Capacitors – Reactive Power Optimization</a:t>
-            </a:r>
-            <a:endParaRPr lang="en-US" dirty="0"/>
-          </a:p>
-        </p:txBody>
-      </p:sp>
-      <p:sp>
-        <p:nvSpPr>
-          <p:cNvPr id="3" name="Content Placeholder 2"/>
-          <p:cNvSpPr>
-            <a:spLocks noGrp="1"/>
-          </p:cNvSpPr>
-          <p:nvPr>
-            <p:ph idx="1"/>
-          </p:nvPr>
-        </p:nvSpPr>
-        <p:spPr/>
-        <p:txBody>
-          <a:bodyPr>
-            <a:normAutofit/>
-          </a:bodyPr>
-          <a:lstStyle/>
-          <a:p>
-            <a:pPr marL="514350" indent="-514350">
-              <a:buFont typeface="+mj-lt"/>
-              <a:buAutoNum type="arabicPeriod" startAt="3"/>
-            </a:pPr>
-            <a:r>
-              <a:rPr lang="en-US" dirty="0" smtClean="0"/>
-              <a:t>If outside range, proceed through capacitors – only change one per operation cycle – dependent on state and size:</a:t>
-            </a:r>
-          </a:p>
-          <a:p>
-            <a:pPr marL="739775" lvl="1" indent="-339725"/>
-            <a:endParaRPr lang="en-US" dirty="0" smtClean="0"/>
-          </a:p>
-          <a:p>
-            <a:pPr marL="739775" lvl="1" indent="-339725"/>
-            <a:r>
-              <a:rPr lang="en-US" i="1" dirty="0" smtClean="0"/>
-              <a:t>ON</a:t>
-            </a:r>
-            <a:r>
-              <a:rPr lang="en-US" dirty="0" smtClean="0"/>
-              <a:t> and</a:t>
-            </a:r>
-            <a:endParaRPr lang="en-US" i="1" baseline="-25000" dirty="0" smtClean="0"/>
-          </a:p>
-          <a:p>
-            <a:pPr marL="400050" lvl="1" indent="0">
-              <a:buNone/>
-            </a:pPr>
-            <a:r>
-              <a:rPr lang="en-US" dirty="0" smtClean="0"/>
-              <a:t>	Capacitor </a:t>
-            </a:r>
-            <a:r>
-              <a:rPr lang="en-US" i="1" dirty="0" smtClean="0"/>
-              <a:t>ON</a:t>
-            </a:r>
-            <a:r>
-              <a:rPr lang="en-US" dirty="0" smtClean="0"/>
-              <a:t> and </a:t>
-            </a:r>
-            <a:r>
-              <a:rPr lang="en-US" i="1" dirty="0" smtClean="0"/>
-              <a:t>reactive power</a:t>
-            </a:r>
-            <a:r>
-              <a:rPr lang="en-US" dirty="0" smtClean="0"/>
-              <a:t> &lt; </a:t>
-            </a:r>
-            <a:r>
-              <a:rPr lang="en-US" i="1" dirty="0" err="1" smtClean="0"/>
-              <a:t>Q</a:t>
-            </a:r>
-            <a:r>
-              <a:rPr lang="en-US" i="1" baseline="-25000" dirty="0" err="1" smtClean="0"/>
-              <a:t>cap_off</a:t>
-            </a:r>
-            <a:r>
-              <a:rPr lang="en-US" dirty="0" smtClean="0"/>
-              <a:t>: switch capacitor to </a:t>
-            </a:r>
-            <a:r>
-              <a:rPr lang="en-US" i="1" dirty="0" smtClean="0"/>
-              <a:t>OFF</a:t>
-            </a:r>
-          </a:p>
-          <a:p>
-            <a:pPr marL="400050" lvl="1" indent="0">
-              <a:buNone/>
-            </a:pPr>
-            <a:endParaRPr lang="en-US" dirty="0" smtClean="0"/>
-          </a:p>
-          <a:p>
-            <a:pPr marL="739775" lvl="1" indent="-339725"/>
-            <a:r>
-              <a:rPr lang="en-US" i="1" dirty="0" smtClean="0"/>
-              <a:t>OFF</a:t>
-            </a:r>
-            <a:r>
-              <a:rPr lang="en-US" dirty="0" smtClean="0"/>
-              <a:t> and</a:t>
-            </a:r>
-            <a:endParaRPr lang="en-US" i="1" baseline="-25000" dirty="0" smtClean="0"/>
-          </a:p>
-          <a:p>
-            <a:pPr marL="800100" lvl="2" indent="0">
-              <a:buNone/>
-            </a:pPr>
-            <a:r>
-              <a:rPr lang="en-US" dirty="0"/>
-              <a:t>	</a:t>
-            </a:r>
-            <a:r>
-              <a:rPr lang="en-US" sz="2000" dirty="0" smtClean="0"/>
-              <a:t>Capacitor </a:t>
-            </a:r>
-            <a:r>
-              <a:rPr lang="en-US" sz="2000" i="1" dirty="0" smtClean="0"/>
-              <a:t>OFF</a:t>
-            </a:r>
-            <a:r>
-              <a:rPr lang="en-US" sz="2000" dirty="0" smtClean="0"/>
-              <a:t> and </a:t>
-            </a:r>
-            <a:r>
-              <a:rPr lang="en-US" sz="2000" i="1" dirty="0" smtClean="0"/>
-              <a:t>reactive power</a:t>
-            </a:r>
-            <a:r>
-              <a:rPr lang="en-US" sz="2000" dirty="0" smtClean="0"/>
-              <a:t> &gt; </a:t>
-            </a:r>
-            <a:r>
-              <a:rPr lang="en-US" sz="2000" i="1" dirty="0" err="1" smtClean="0"/>
-              <a:t>Q</a:t>
-            </a:r>
-            <a:r>
-              <a:rPr lang="en-US" sz="2000" i="1" baseline="-25000" dirty="0" err="1" smtClean="0"/>
-              <a:t>cap_on</a:t>
-            </a:r>
-            <a:r>
-              <a:rPr lang="en-US" sz="2000" dirty="0" smtClean="0"/>
-              <a:t>: switch capacitor to </a:t>
-            </a:r>
-            <a:r>
-              <a:rPr lang="en-US" sz="2000" i="1" dirty="0" smtClean="0"/>
-              <a:t>ON</a:t>
-            </a:r>
-          </a:p>
-          <a:p>
-            <a:pPr marL="800100" lvl="2" indent="0">
-              <a:buNone/>
-            </a:pPr>
-            <a:endParaRPr lang="en-US" sz="2000" dirty="0" smtClean="0"/>
-          </a:p>
-          <a:p>
-            <a:pPr marL="739775" lvl="1" indent="-339725"/>
-            <a:r>
-              <a:rPr lang="en-US" dirty="0" smtClean="0"/>
-              <a:t>Neither met</a:t>
-            </a:r>
-          </a:p>
-          <a:p>
-            <a:pPr marL="800100" lvl="2" indent="0">
-              <a:buNone/>
-            </a:pPr>
-            <a:r>
-              <a:rPr lang="en-US" dirty="0"/>
-              <a:t>	</a:t>
-            </a:r>
-            <a:r>
-              <a:rPr lang="en-US" sz="2000" dirty="0" smtClean="0"/>
-              <a:t>Proceed to next largest capacitor and continue check</a:t>
-            </a:r>
-          </a:p>
-        </p:txBody>
-      </p:sp>
-      <p:sp>
-        <p:nvSpPr>
-          <p:cNvPr id="4" name="Slide Number Placeholder 3"/>
-          <p:cNvSpPr>
-            <a:spLocks noGrp="1"/>
-          </p:cNvSpPr>
-          <p:nvPr>
-            <p:ph type="sldNum" sz="quarter" idx="12"/>
-          </p:nvPr>
-        </p:nvSpPr>
-        <p:spPr/>
-        <p:txBody>
-          <a:bodyPr/>
-          <a:lstStyle/>
-          <a:p>
-            <a:fld id="{B6F15528-21DE-4FAA-801E-634DDDAF4B2B}" type="slidenum">
-              <a:rPr lang="en-US" smtClean="0"/>
-              <a:pPr/>
-              <a:t>20</a:t>
-            </a:fld>
-            <a:endParaRPr lang="en-US"/>
-          </a:p>
-        </p:txBody>
-      </p:sp>
-      <p:graphicFrame>
-        <p:nvGraphicFramePr>
-          <p:cNvPr id="5" name="Object 4"/>
-          <p:cNvGraphicFramePr>
-            <a:graphicFrameLocks noChangeAspect="1"/>
-          </p:cNvGraphicFramePr>
-          <p:nvPr>
-            <p:extLst>
-              <p:ext uri="{D42A27DB-BD31-4B8C-83A1-F6EECF244321}">
-                <p14:modId xmlns:p14="http://schemas.microsoft.com/office/powerpoint/2010/main" val="3880563166"/>
-              </p:ext>
-            </p:extLst>
-          </p:nvPr>
-        </p:nvGraphicFramePr>
-        <p:xfrm>
-          <a:off x="2107473" y="2788887"/>
-          <a:ext cx="1441678" cy="402804"/>
-        </p:xfrm>
-        <a:graphic>
-          <a:graphicData uri="http://schemas.openxmlformats.org/presentationml/2006/ole">
-            <mc:AlternateContent xmlns:mc="http://schemas.openxmlformats.org/markup-compatibility/2006">
-              <mc:Choice xmlns:v="urn:schemas-microsoft-com:vml" Requires="v">
-                <p:oleObj spid="_x0000_s7198" name="Equation" r:id="rId3" imgW="863280" imgH="241200" progId="Equation.3">
-                  <p:embed/>
-                </p:oleObj>
-              </mc:Choice>
-              <mc:Fallback>
-                <p:oleObj name="Equation" r:id="rId3" imgW="863280" imgH="241200" progId="Equation.3">
-                  <p:embed/>
-                  <p:pic>
-                    <p:nvPicPr>
-                      <p:cNvPr id="0" name=""/>
-                      <p:cNvPicPr/>
-                      <p:nvPr/>
-                    </p:nvPicPr>
-                    <p:blipFill>
-                      <a:blip r:embed="rId4"/>
-                      <a:stretch>
-                        <a:fillRect/>
-                      </a:stretch>
-                    </p:blipFill>
-                    <p:spPr>
-                      <a:xfrm>
-                        <a:off x="2107473" y="2788887"/>
-                        <a:ext cx="1441678" cy="402804"/>
-                      </a:xfrm>
-                      <a:prstGeom prst="rect">
-                        <a:avLst/>
-                      </a:prstGeom>
-                    </p:spPr>
-                  </p:pic>
-                </p:oleObj>
-              </mc:Fallback>
-            </mc:AlternateContent>
-          </a:graphicData>
-        </a:graphic>
-      </p:graphicFrame>
-      <p:graphicFrame>
-        <p:nvGraphicFramePr>
-          <p:cNvPr id="6" name="Object 5"/>
-          <p:cNvGraphicFramePr>
-            <a:graphicFrameLocks noChangeAspect="1"/>
-          </p:cNvGraphicFramePr>
-          <p:nvPr>
-            <p:extLst>
-              <p:ext uri="{D42A27DB-BD31-4B8C-83A1-F6EECF244321}">
-                <p14:modId xmlns:p14="http://schemas.microsoft.com/office/powerpoint/2010/main" val="1900855747"/>
-              </p:ext>
-            </p:extLst>
-          </p:nvPr>
-        </p:nvGraphicFramePr>
-        <p:xfrm>
-          <a:off x="2258006" y="3886200"/>
-          <a:ext cx="1399594" cy="402804"/>
-        </p:xfrm>
-        <a:graphic>
-          <a:graphicData uri="http://schemas.openxmlformats.org/presentationml/2006/ole">
-            <mc:AlternateContent xmlns:mc="http://schemas.openxmlformats.org/markup-compatibility/2006">
-              <mc:Choice xmlns:v="urn:schemas-microsoft-com:vml" Requires="v">
-                <p:oleObj spid="_x0000_s7199" name="Equation" r:id="rId5" imgW="838080" imgH="241200" progId="Equation.3">
-                  <p:embed/>
-                </p:oleObj>
-              </mc:Choice>
-              <mc:Fallback>
-                <p:oleObj name="Equation" r:id="rId5" imgW="838080" imgH="241200" progId="Equation.3">
-                  <p:embed/>
-                  <p:pic>
-                    <p:nvPicPr>
-                      <p:cNvPr id="0" name=""/>
-                      <p:cNvPicPr/>
-                      <p:nvPr/>
-                    </p:nvPicPr>
-                    <p:blipFill>
-                      <a:blip r:embed="rId6"/>
-                      <a:stretch>
-                        <a:fillRect/>
-                      </a:stretch>
-                    </p:blipFill>
-                    <p:spPr>
-                      <a:xfrm>
-                        <a:off x="2258006" y="3886200"/>
-                        <a:ext cx="1399594" cy="402804"/>
-                      </a:xfrm>
-                      <a:prstGeom prst="rect">
-                        <a:avLst/>
-                      </a:prstGeom>
-                    </p:spPr>
-                  </p:pic>
-                </p:oleObj>
-              </mc:Fallback>
-            </mc:AlternateContent>
-          </a:graphicData>
-        </a:graphic>
-      </p:graphicFrame>
-    </p:spTree>
-    <p:extLst>
-      <p:ext uri="{BB962C8B-B14F-4D97-AF65-F5344CB8AC3E}">
-        <p14:creationId xmlns:p14="http://schemas.microsoft.com/office/powerpoint/2010/main" val="393414313"/>
-      </p:ext>
-    </p:extLst>
-  </p:cSld>
-  <p:clrMapOvr>
-    <a:masterClrMapping/>
-  </p:clrMapOvr>
-  <p:timing>
-    <p:tnLst>
-      <p:par>
-        <p:cTn id="1" dur="indefinite" restart="never" nodeType="tmRoot"/>
-      </p:par>
-    </p:tnLst>
-  </p:timing>
-</p:sld>
-</file>
-
-<file path=ppt/slides/slide21.xml><?xml version="1.0" encoding="utf-8"?>
-<p:sld xmlns:a="http://schemas.openxmlformats.org/drawingml/2006/main" xmlns:r="http://schemas.openxmlformats.org/officeDocument/2006/relationships" xmlns:p="http://schemas.openxmlformats.org/presentationml/2006/main">
-  <p:cSld>
-    <p:spTree>
-      <p:nvGrpSpPr>
-        <p:cNvPr id="1" name=""/>
-        <p:cNvGrpSpPr/>
-        <p:nvPr/>
-      </p:nvGrpSpPr>
-      <p:grpSpPr>
-        <a:xfrm>
-          <a:off x="0" y="0"/>
-          <a:ext cx="0" cy="0"/>
-          <a:chOff x="0" y="0"/>
-          <a:chExt cx="0" cy="0"/>
-        </a:xfrm>
-      </p:grpSpPr>
-      <p:sp>
-        <p:nvSpPr>
-          <p:cNvPr id="2" name="Title 1"/>
-          <p:cNvSpPr>
-            <a:spLocks noGrp="1"/>
-          </p:cNvSpPr>
-          <p:nvPr>
-            <p:ph type="title"/>
-          </p:nvPr>
-        </p:nvSpPr>
-        <p:spPr/>
-        <p:txBody>
           <a:bodyPr/>
           <a:lstStyle/>
           <a:p>
@@ -7477,7 +7333,7 @@
             <a:fld id="{B6F15528-21DE-4FAA-801E-634DDDAF4B2B}" type="slidenum">
               <a:rPr lang="en-US" smtClean="0"/>
               <a:pPr/>
-              <a:t>21</a:t>
+              <a:t>20</a:t>
             </a:fld>
             <a:endParaRPr lang="en-US"/>
           </a:p>
@@ -7503,7 +7359,7 @@
 </p:sld>
 </file>
 
-<file path=ppt/slides/slide22.xml><?xml version="1.0" encoding="utf-8"?>
+<file path=ppt/slides/slide21.xml><?xml version="1.0" encoding="utf-8"?>
 <p:sld xmlns:a="http://schemas.openxmlformats.org/drawingml/2006/main" xmlns:r="http://schemas.openxmlformats.org/officeDocument/2006/relationships" xmlns:p="http://schemas.openxmlformats.org/presentationml/2006/main">
   <p:cSld>
     <p:spTree>
@@ -7705,7 +7561,7 @@
             <a:fld id="{B6F15528-21DE-4FAA-801E-634DDDAF4B2B}" type="slidenum">
               <a:rPr lang="en-US" smtClean="0"/>
               <a:pPr/>
-              <a:t>22</a:t>
+              <a:t>21</a:t>
             </a:fld>
             <a:endParaRPr lang="en-US"/>
           </a:p>
@@ -7731,7 +7587,7 @@
 </p:sld>
 </file>
 
-<file path=ppt/slides/slide23.xml><?xml version="1.0" encoding="utf-8"?>
+<file path=ppt/slides/slide22.xml><?xml version="1.0" encoding="utf-8"?>
 <p:sld xmlns:a="http://schemas.openxmlformats.org/drawingml/2006/main" xmlns:r="http://schemas.openxmlformats.org/officeDocument/2006/relationships" xmlns:p="http://schemas.openxmlformats.org/presentationml/2006/main">
   <p:cSld>
     <p:spTree>
@@ -7901,7 +7757,7 @@
             <a:fld id="{B6F15528-21DE-4FAA-801E-634DDDAF4B2B}" type="slidenum">
               <a:rPr lang="en-US" smtClean="0"/>
               <a:pPr/>
-              <a:t>23</a:t>
+              <a:t>22</a:t>
             </a:fld>
             <a:endParaRPr lang="en-US"/>
           </a:p>
@@ -7927,7 +7783,7 @@
 </p:sld>
 </file>
 
-<file path=ppt/slides/slide24.xml><?xml version="1.0" encoding="utf-8"?>
+<file path=ppt/slides/slide23.xml><?xml version="1.0" encoding="utf-8"?>
 <p:sld xmlns:a="http://schemas.openxmlformats.org/drawingml/2006/main" xmlns:r="http://schemas.openxmlformats.org/officeDocument/2006/relationships" xmlns:p="http://schemas.openxmlformats.org/presentationml/2006/main">
   <p:cSld>
     <p:spTree>
@@ -8129,7 +7985,7 @@
             <a:fld id="{B6F15528-21DE-4FAA-801E-634DDDAF4B2B}" type="slidenum">
               <a:rPr lang="en-US" smtClean="0"/>
               <a:pPr/>
-              <a:t>24</a:t>
+              <a:t>23</a:t>
             </a:fld>
             <a:endParaRPr lang="en-US"/>
           </a:p>
@@ -8155,7 +8011,7 @@
 </p:sld>
 </file>
 
-<file path=ppt/slides/slide25.xml><?xml version="1.0" encoding="utf-8"?>
+<file path=ppt/slides/slide24.xml><?xml version="1.0" encoding="utf-8"?>
 <p:sld xmlns:a="http://schemas.openxmlformats.org/drawingml/2006/main" xmlns:r="http://schemas.openxmlformats.org/officeDocument/2006/relationships" xmlns:p="http://schemas.openxmlformats.org/presentationml/2006/main">
   <p:cSld>
     <p:spTree>
@@ -8369,7 +8225,7 @@
             <a:fld id="{B6F15528-21DE-4FAA-801E-634DDDAF4B2B}" type="slidenum">
               <a:rPr lang="en-US" smtClean="0"/>
               <a:pPr/>
-              <a:t>25</a:t>
+              <a:t>24</a:t>
             </a:fld>
             <a:endParaRPr lang="en-US"/>
           </a:p>
@@ -8395,7 +8251,7 @@
 </p:sld>
 </file>
 
-<file path=ppt/slides/slide26.xml><?xml version="1.0" encoding="utf-8"?>
+<file path=ppt/slides/slide25.xml><?xml version="1.0" encoding="utf-8"?>
 <p:sld xmlns:a="http://schemas.openxmlformats.org/drawingml/2006/main" xmlns:r="http://schemas.openxmlformats.org/officeDocument/2006/relationships" xmlns:p="http://schemas.openxmlformats.org/presentationml/2006/main">
   <p:cSld>
     <p:spTree>
@@ -8548,7 +8404,7 @@
             <a:fld id="{B6F15528-21DE-4FAA-801E-634DDDAF4B2B}" type="slidenum">
               <a:rPr lang="en-US" smtClean="0"/>
               <a:pPr/>
-              <a:t>26</a:t>
+              <a:t>25</a:t>
             </a:fld>
             <a:endParaRPr lang="en-US"/>
           </a:p>
@@ -8574,7 +8430,7 @@
 </p:sld>
 </file>
 
-<file path=ppt/slides/slide27.xml><?xml version="1.0" encoding="utf-8"?>
+<file path=ppt/slides/slide26.xml><?xml version="1.0" encoding="utf-8"?>
 <p:sld xmlns:a="http://schemas.openxmlformats.org/drawingml/2006/main" xmlns:r="http://schemas.openxmlformats.org/officeDocument/2006/relationships" xmlns:p="http://schemas.openxmlformats.org/presentationml/2006/main">
   <p:cSld>
     <p:spTree>
@@ -8772,7 +8628,7 @@
             <a:fld id="{B6F15528-21DE-4FAA-801E-634DDDAF4B2B}" type="slidenum">
               <a:rPr lang="en-US" smtClean="0"/>
               <a:pPr/>
-              <a:t>27</a:t>
+              <a:t>26</a:t>
             </a:fld>
             <a:endParaRPr lang="en-US"/>
           </a:p>
@@ -8798,7 +8654,7 @@
 </p:sld>
 </file>
 
-<file path=ppt/slides/slide28.xml><?xml version="1.0" encoding="utf-8"?>
+<file path=ppt/slides/slide27.xml><?xml version="1.0" encoding="utf-8"?>
 <p:sld xmlns:a="http://schemas.openxmlformats.org/drawingml/2006/main" xmlns:r="http://schemas.openxmlformats.org/officeDocument/2006/relationships" xmlns:p="http://schemas.openxmlformats.org/presentationml/2006/main">
   <p:cSld>
     <p:spTree>
@@ -9038,7 +8894,7 @@
             <a:fld id="{B6F15528-21DE-4FAA-801E-634DDDAF4B2B}" type="slidenum">
               <a:rPr lang="en-US" smtClean="0"/>
               <a:pPr/>
-              <a:t>28</a:t>
+              <a:t>27</a:t>
             </a:fld>
             <a:endParaRPr lang="en-US"/>
           </a:p>
@@ -9064,7 +8920,7 @@
 </p:sld>
 </file>
 
-<file path=ppt/slides/slide29.xml><?xml version="1.0" encoding="utf-8"?>
+<file path=ppt/slides/slide28.xml><?xml version="1.0" encoding="utf-8"?>
 <p:sld xmlns:a="http://schemas.openxmlformats.org/drawingml/2006/main" xmlns:r="http://schemas.openxmlformats.org/officeDocument/2006/relationships" xmlns:p="http://schemas.openxmlformats.org/presentationml/2006/main">
   <p:cSld>
     <p:spTree>
@@ -9229,7 +9085,7 @@
             <a:fld id="{B6F15528-21DE-4FAA-801E-634DDDAF4B2B}" type="slidenum">
               <a:rPr lang="en-US" smtClean="0"/>
               <a:pPr/>
-              <a:t>29</a:t>
+              <a:t>28</a:t>
             </a:fld>
             <a:endParaRPr lang="en-US"/>
           </a:p>
@@ -9241,6 +9097,145 @@
         <p14:creationId xmlns:p14="http://schemas.microsoft.com/office/powerpoint/2010/main" val="1795825991"/>
       </p:ext>
     </p:extLst>
+  </p:cSld>
+  <p:clrMapOvr>
+    <a:masterClrMapping/>
+  </p:clrMapOvr>
+  <p:timing>
+    <p:tnLst>
+      <p:par>
+        <p:cTn id="1" dur="indefinite" restart="never" nodeType="tmRoot"/>
+      </p:par>
+    </p:tnLst>
+  </p:timing>
+</p:sld>
+</file>
+
+<file path=ppt/slides/slide29.xml><?xml version="1.0" encoding="utf-8"?>
+<p:sld xmlns:a="http://schemas.openxmlformats.org/drawingml/2006/main" xmlns:r="http://schemas.openxmlformats.org/officeDocument/2006/relationships" xmlns:p="http://schemas.openxmlformats.org/presentationml/2006/main">
+  <p:cSld>
+    <p:spTree>
+      <p:nvGrpSpPr>
+        <p:cNvPr id="1" name=""/>
+        <p:cNvGrpSpPr/>
+        <p:nvPr/>
+      </p:nvGrpSpPr>
+      <p:grpSpPr>
+        <a:xfrm>
+          <a:off x="0" y="0"/>
+          <a:ext cx="0" cy="0"/>
+          <a:chOff x="0" y="0"/>
+          <a:chExt cx="0" cy="0"/>
+        </a:xfrm>
+      </p:grpSpPr>
+      <p:sp>
+        <p:nvSpPr>
+          <p:cNvPr id="2" name="Title 1"/>
+          <p:cNvSpPr>
+            <a:spLocks noGrp="1"/>
+          </p:cNvSpPr>
+          <p:nvPr>
+            <p:ph type="title"/>
+          </p:nvPr>
+        </p:nvSpPr>
+        <p:spPr/>
+        <p:txBody>
+          <a:bodyPr>
+            <a:normAutofit/>
+          </a:bodyPr>
+          <a:lstStyle/>
+          <a:p>
+            <a:r>
+              <a:rPr lang="en-US" dirty="0" smtClean="0"/>
+              <a:t>Integrated Volt/VAR Control in Distribution Systems</a:t>
+            </a:r>
+            <a:endParaRPr lang="en-US" dirty="0"/>
+          </a:p>
+        </p:txBody>
+      </p:sp>
+      <p:sp>
+        <p:nvSpPr>
+          <p:cNvPr id="3" name="Content Placeholder 2"/>
+          <p:cNvSpPr>
+            <a:spLocks noGrp="1"/>
+          </p:cNvSpPr>
+          <p:nvPr>
+            <p:ph idx="1"/>
+          </p:nvPr>
+        </p:nvSpPr>
+        <p:spPr/>
+        <p:txBody>
+          <a:bodyPr>
+            <a:normAutofit/>
+          </a:bodyPr>
+          <a:lstStyle/>
+          <a:p>
+            <a:r>
+              <a:rPr lang="en-US" dirty="0" smtClean="0"/>
+              <a:t>This is an openly available Volt-VAR control system that has been implemented in GridLAB-D.</a:t>
+            </a:r>
+          </a:p>
+          <a:p>
+            <a:endParaRPr lang="en-US" dirty="0" smtClean="0"/>
+          </a:p>
+          <a:p>
+            <a:r>
+              <a:rPr lang="en-US" dirty="0" smtClean="0"/>
+              <a:t>It is composed of two coordinated goals.</a:t>
+            </a:r>
+          </a:p>
+          <a:p>
+            <a:pPr lvl="1"/>
+            <a:r>
+              <a:rPr lang="en-US" dirty="0" smtClean="0"/>
+              <a:t>Voltage reduction</a:t>
+            </a:r>
+          </a:p>
+          <a:p>
+            <a:pPr lvl="1"/>
+            <a:r>
+              <a:rPr lang="en-US" dirty="0" smtClean="0"/>
+              <a:t>VAR control</a:t>
+            </a:r>
+          </a:p>
+          <a:p>
+            <a:pPr lvl="1"/>
+            <a:endParaRPr lang="en-US" dirty="0" smtClean="0"/>
+          </a:p>
+          <a:p>
+            <a:pPr lvl="1"/>
+            <a:endParaRPr lang="en-US" dirty="0" smtClean="0"/>
+          </a:p>
+          <a:p>
+            <a:endParaRPr lang="en-US" dirty="0" smtClean="0"/>
+          </a:p>
+        </p:txBody>
+      </p:sp>
+      <p:sp>
+        <p:nvSpPr>
+          <p:cNvPr id="4" name="Slide Number Placeholder 3"/>
+          <p:cNvSpPr>
+            <a:spLocks noGrp="1"/>
+          </p:cNvSpPr>
+          <p:nvPr>
+            <p:ph type="sldNum" sz="quarter" idx="12"/>
+          </p:nvPr>
+        </p:nvSpPr>
+        <p:spPr/>
+        <p:txBody>
+          <a:bodyPr/>
+          <a:lstStyle/>
+          <a:p>
+            <a:fld id="{B6F15528-21DE-4FAA-801E-634DDDAF4B2B}" type="slidenum">
+              <a:rPr lang="en-US" smtClean="0"/>
+              <a:pPr/>
+              <a:t>29</a:t>
+            </a:fld>
+            <a:endParaRPr lang="en-US"/>
+          </a:p>
+        </p:txBody>
+      </p:sp>
+    </p:spTree>
   </p:cSld>
   <p:clrMapOvr>
     <a:masterClrMapping/>
@@ -9318,16 +9313,23 @@
           <a:lstStyle/>
           <a:p>
             <a:r>
-              <a:rPr lang="en-US" sz="2400" dirty="0" smtClean="0"/>
-              <a:t>The voltage supplied to the customer is generally maintained within the limits set by ANSI C84.1, 120V +/-5%.</a:t>
-            </a:r>
-          </a:p>
-          <a:p>
-            <a:r>
-              <a:rPr lang="en-US" sz="2400" dirty="0" smtClean="0"/>
+              <a:rPr lang="en-US" sz="2000" dirty="0" smtClean="0"/>
+              <a:t>The voltage supplied to the customer is generally maintained within the limits set by ANSI C84.1, 120V +/-5</a:t>
+            </a:r>
+            <a:r>
+              <a:rPr lang="en-US" sz="2000" dirty="0" smtClean="0"/>
+              <a:t>%.</a:t>
+            </a:r>
+          </a:p>
+          <a:p>
+            <a:endParaRPr lang="en-US" sz="2000" dirty="0" smtClean="0"/>
+          </a:p>
+          <a:p>
+            <a:r>
+              <a:rPr lang="en-US" sz="2000" dirty="0" smtClean="0"/>
               <a:t>This is done by setting the voltage at the “head” of the feeder at the high end of the band, to ensure that the voltage drop at peak load does not exceed limits.</a:t>
             </a:r>
-            <a:endParaRPr lang="en-US" sz="2400" dirty="0"/>
+            <a:endParaRPr lang="en-US" sz="2000" dirty="0"/>
           </a:p>
         </p:txBody>
       </p:sp>
@@ -9437,145 +9439,6 @@
           <a:lstStyle/>
           <a:p>
             <a:r>
-              <a:rPr lang="en-US" dirty="0" smtClean="0"/>
-              <a:t>Integrated Volt/VAR Control in Distribution Systems</a:t>
-            </a:r>
-            <a:endParaRPr lang="en-US" dirty="0"/>
-          </a:p>
-        </p:txBody>
-      </p:sp>
-      <p:sp>
-        <p:nvSpPr>
-          <p:cNvPr id="3" name="Content Placeholder 2"/>
-          <p:cNvSpPr>
-            <a:spLocks noGrp="1"/>
-          </p:cNvSpPr>
-          <p:nvPr>
-            <p:ph idx="1"/>
-          </p:nvPr>
-        </p:nvSpPr>
-        <p:spPr/>
-        <p:txBody>
-          <a:bodyPr>
-            <a:normAutofit/>
-          </a:bodyPr>
-          <a:lstStyle/>
-          <a:p>
-            <a:r>
-              <a:rPr lang="en-US" dirty="0" smtClean="0"/>
-              <a:t>This is an openly available Volt-VAR control system that has been implemented in GridLAB-D.</a:t>
-            </a:r>
-          </a:p>
-          <a:p>
-            <a:endParaRPr lang="en-US" dirty="0" smtClean="0"/>
-          </a:p>
-          <a:p>
-            <a:r>
-              <a:rPr lang="en-US" dirty="0" smtClean="0"/>
-              <a:t>It is composed of two coordinated goals.</a:t>
-            </a:r>
-          </a:p>
-          <a:p>
-            <a:pPr lvl="1"/>
-            <a:r>
-              <a:rPr lang="en-US" dirty="0" smtClean="0"/>
-              <a:t>Voltage reduction</a:t>
-            </a:r>
-          </a:p>
-          <a:p>
-            <a:pPr lvl="1"/>
-            <a:r>
-              <a:rPr lang="en-US" dirty="0" smtClean="0"/>
-              <a:t>VAR control</a:t>
-            </a:r>
-          </a:p>
-          <a:p>
-            <a:pPr lvl="1"/>
-            <a:endParaRPr lang="en-US" dirty="0" smtClean="0"/>
-          </a:p>
-          <a:p>
-            <a:pPr lvl="1"/>
-            <a:endParaRPr lang="en-US" dirty="0" smtClean="0"/>
-          </a:p>
-          <a:p>
-            <a:endParaRPr lang="en-US" dirty="0" smtClean="0"/>
-          </a:p>
-        </p:txBody>
-      </p:sp>
-      <p:sp>
-        <p:nvSpPr>
-          <p:cNvPr id="4" name="Slide Number Placeholder 3"/>
-          <p:cNvSpPr>
-            <a:spLocks noGrp="1"/>
-          </p:cNvSpPr>
-          <p:nvPr>
-            <p:ph type="sldNum" sz="quarter" idx="12"/>
-          </p:nvPr>
-        </p:nvSpPr>
-        <p:spPr/>
-        <p:txBody>
-          <a:bodyPr/>
-          <a:lstStyle/>
-          <a:p>
-            <a:fld id="{B6F15528-21DE-4FAA-801E-634DDDAF4B2B}" type="slidenum">
-              <a:rPr lang="en-US" smtClean="0"/>
-              <a:pPr/>
-              <a:t>30</a:t>
-            </a:fld>
-            <a:endParaRPr lang="en-US"/>
-          </a:p>
-        </p:txBody>
-      </p:sp>
-    </p:spTree>
-  </p:cSld>
-  <p:clrMapOvr>
-    <a:masterClrMapping/>
-  </p:clrMapOvr>
-  <p:timing>
-    <p:tnLst>
-      <p:par>
-        <p:cTn id="1" dur="indefinite" restart="never" nodeType="tmRoot"/>
-      </p:par>
-    </p:tnLst>
-  </p:timing>
-</p:sld>
-</file>
-
-<file path=ppt/slides/slide31.xml><?xml version="1.0" encoding="utf-8"?>
-<p:sld xmlns:a="http://schemas.openxmlformats.org/drawingml/2006/main" xmlns:r="http://schemas.openxmlformats.org/officeDocument/2006/relationships" xmlns:p="http://schemas.openxmlformats.org/presentationml/2006/main">
-  <p:cSld>
-    <p:spTree>
-      <p:nvGrpSpPr>
-        <p:cNvPr id="1" name=""/>
-        <p:cNvGrpSpPr/>
-        <p:nvPr/>
-      </p:nvGrpSpPr>
-      <p:grpSpPr>
-        <a:xfrm>
-          <a:off x="0" y="0"/>
-          <a:ext cx="0" cy="0"/>
-          <a:chOff x="0" y="0"/>
-          <a:chExt cx="0" cy="0"/>
-        </a:xfrm>
-      </p:grpSpPr>
-      <p:sp>
-        <p:nvSpPr>
-          <p:cNvPr id="2" name="Title 1"/>
-          <p:cNvSpPr>
-            <a:spLocks noGrp="1"/>
-          </p:cNvSpPr>
-          <p:nvPr>
-            <p:ph type="title"/>
-          </p:nvPr>
-        </p:nvSpPr>
-        <p:spPr/>
-        <p:txBody>
-          <a:bodyPr>
-            <a:normAutofit/>
-          </a:bodyPr>
-          <a:lstStyle/>
-          <a:p>
-            <a:r>
               <a:rPr lang="en-US" dirty="0" smtClean="0">
                 <a:latin typeface="Times New Roman" pitchFamily="18" charset="0"/>
                 <a:cs typeface="Times New Roman" pitchFamily="18" charset="0"/>
@@ -9724,7 +9587,7 @@
                 <a:cs typeface="Times New Roman" pitchFamily="18" charset="0"/>
               </a:rPr>
               <a:pPr/>
-              <a:t>31</a:t>
+              <a:t>30</a:t>
             </a:fld>
             <a:endParaRPr lang="en-US">
               <a:latin typeface="Times New Roman" pitchFamily="18" charset="0"/>
@@ -9819,7 +9682,7 @@
 </p:sld>
 </file>
 
-<file path=ppt/slides/slide32.xml><?xml version="1.0" encoding="utf-8"?>
+<file path=ppt/slides/slide31.xml><?xml version="1.0" encoding="utf-8"?>
 <p:sld xmlns:a="http://schemas.openxmlformats.org/drawingml/2006/main" xmlns:r="http://schemas.openxmlformats.org/officeDocument/2006/relationships" xmlns:p="http://schemas.openxmlformats.org/presentationml/2006/main">
   <p:cSld>
     <p:spTree>
@@ -10350,7 +10213,7 @@
                 <a:cs typeface="Times New Roman" pitchFamily="18" charset="0"/>
               </a:rPr>
               <a:pPr/>
-              <a:t>32</a:t>
+              <a:t>31</a:t>
             </a:fld>
             <a:endParaRPr lang="en-US">
               <a:latin typeface="Times New Roman" pitchFamily="18" charset="0"/>
@@ -12195,7 +12058,7 @@
 </p:sld>
 </file>
 
-<file path=ppt/slides/slide33.xml><?xml version="1.0" encoding="utf-8"?>
+<file path=ppt/slides/slide32.xml><?xml version="1.0" encoding="utf-8"?>
 <p:sld xmlns:a="http://schemas.openxmlformats.org/drawingml/2006/main" xmlns:r="http://schemas.openxmlformats.org/officeDocument/2006/relationships" xmlns:p="http://schemas.openxmlformats.org/presentationml/2006/main">
   <p:cSld>
     <p:spTree>
@@ -13545,14 +13408,7 @@
                 <a:latin typeface="Times New Roman" pitchFamily="18" charset="0"/>
                 <a:cs typeface="Times New Roman" pitchFamily="18" charset="0"/>
               </a:rPr>
-              <a:t>Case </a:t>
-            </a:r>
-            <a:r>
-              <a:rPr lang="en-US" sz="3200" dirty="0" smtClean="0">
-                <a:latin typeface="Times New Roman" pitchFamily="18" charset="0"/>
-                <a:cs typeface="Times New Roman" pitchFamily="18" charset="0"/>
-              </a:rPr>
-              <a:t>1 (continued)</a:t>
+              <a:t>Case 1 (continued)</a:t>
             </a:r>
             <a:endParaRPr lang="en-US" sz="3200" dirty="0">
               <a:latin typeface="Times New Roman" pitchFamily="18" charset="0"/>
@@ -13781,7 +13637,7 @@
 </p:sld>
 </file>
 
-<file path=ppt/slides/slide34.xml><?xml version="1.0" encoding="utf-8"?>
+<file path=ppt/slides/slide33.xml><?xml version="1.0" encoding="utf-8"?>
 <p:sld xmlns:a="http://schemas.openxmlformats.org/drawingml/2006/main" xmlns:r="http://schemas.openxmlformats.org/officeDocument/2006/relationships" xmlns:p="http://schemas.openxmlformats.org/presentationml/2006/main">
   <p:cSld>
     <p:spTree>
@@ -13843,14 +13699,7 @@
                 <a:latin typeface="Times New Roman" pitchFamily="18" charset="0"/>
                 <a:cs typeface="Times New Roman" pitchFamily="18" charset="0"/>
               </a:rPr>
-              <a:t>Case </a:t>
-            </a:r>
-            <a:r>
-              <a:rPr lang="en-US" sz="3200" dirty="0" smtClean="0">
-                <a:latin typeface="Times New Roman" pitchFamily="18" charset="0"/>
-                <a:cs typeface="Times New Roman" pitchFamily="18" charset="0"/>
-              </a:rPr>
-              <a:t>2a</a:t>
+              <a:t>Case 2a</a:t>
             </a:r>
             <a:endParaRPr lang="en-US" sz="3200" dirty="0">
               <a:latin typeface="Times New Roman" pitchFamily="18" charset="0"/>
@@ -15360,7 +15209,7 @@
 </p:sld>
 </file>
 
-<file path=ppt/slides/slide35.xml><?xml version="1.0" encoding="utf-8"?>
+<file path=ppt/slides/slide34.xml><?xml version="1.0" encoding="utf-8"?>
 <p:sld xmlns:a="http://schemas.openxmlformats.org/drawingml/2006/main" xmlns:r="http://schemas.openxmlformats.org/officeDocument/2006/relationships" xmlns:p="http://schemas.openxmlformats.org/presentationml/2006/main">
   <p:cSld>
     <p:spTree>
@@ -16777,14 +16626,7 @@
                 <a:latin typeface="Times New Roman" pitchFamily="18" charset="0"/>
                 <a:cs typeface="Times New Roman" pitchFamily="18" charset="0"/>
               </a:rPr>
-              <a:t>Case </a:t>
-            </a:r>
-            <a:r>
-              <a:rPr lang="en-US" sz="3200" dirty="0" smtClean="0">
-                <a:latin typeface="Times New Roman" pitchFamily="18" charset="0"/>
-                <a:cs typeface="Times New Roman" pitchFamily="18" charset="0"/>
-              </a:rPr>
-              <a:t>2b</a:t>
+              <a:t>Case 2b</a:t>
             </a:r>
             <a:endParaRPr lang="en-US" sz="3200" dirty="0">
               <a:latin typeface="Times New Roman" pitchFamily="18" charset="0"/>
@@ -16972,7 +16814,7 @@
 </p:sld>
 </file>
 
-<file path=ppt/slides/slide36.xml><?xml version="1.0" encoding="utf-8"?>
+<file path=ppt/slides/slide35.xml><?xml version="1.0" encoding="utf-8"?>
 <p:sld xmlns:a="http://schemas.openxmlformats.org/drawingml/2006/main" xmlns:r="http://schemas.openxmlformats.org/officeDocument/2006/relationships" xmlns:p="http://schemas.openxmlformats.org/presentationml/2006/main">
   <p:cSld>
     <p:spTree>
@@ -17030,14 +16872,7 @@
                 <a:latin typeface="Times New Roman" pitchFamily="18" charset="0"/>
                 <a:cs typeface="Times New Roman" pitchFamily="18" charset="0"/>
               </a:rPr>
-              <a:t>Case </a:t>
-            </a:r>
-            <a:r>
-              <a:rPr lang="en-US" sz="3200" dirty="0" smtClean="0">
-                <a:latin typeface="Times New Roman" pitchFamily="18" charset="0"/>
-                <a:cs typeface="Times New Roman" pitchFamily="18" charset="0"/>
-              </a:rPr>
-              <a:t>3a</a:t>
+              <a:t>Case 3a</a:t>
             </a:r>
             <a:endParaRPr lang="en-US" sz="3200" dirty="0">
               <a:latin typeface="Times New Roman" pitchFamily="18" charset="0"/>
@@ -18476,7 +18311,7 @@
 </p:sld>
 </file>
 
-<file path=ppt/slides/slide37.xml><?xml version="1.0" encoding="utf-8"?>
+<file path=ppt/slides/slide36.xml><?xml version="1.0" encoding="utf-8"?>
 <p:sld xmlns:a="http://schemas.openxmlformats.org/drawingml/2006/main" xmlns:r="http://schemas.openxmlformats.org/officeDocument/2006/relationships" xmlns:p="http://schemas.openxmlformats.org/presentationml/2006/main">
   <p:cSld>
     <p:spTree>
@@ -18534,14 +18369,7 @@
                 <a:latin typeface="Times New Roman" pitchFamily="18" charset="0"/>
                 <a:cs typeface="Times New Roman" pitchFamily="18" charset="0"/>
               </a:rPr>
-              <a:t>Case </a:t>
-            </a:r>
-            <a:r>
-              <a:rPr lang="en-US" sz="3200" dirty="0" smtClean="0">
-                <a:latin typeface="Times New Roman" pitchFamily="18" charset="0"/>
-                <a:cs typeface="Times New Roman" pitchFamily="18" charset="0"/>
-              </a:rPr>
-              <a:t>3b</a:t>
+              <a:t>Case 3b</a:t>
             </a:r>
             <a:endParaRPr lang="en-US" sz="3200" dirty="0">
               <a:latin typeface="Times New Roman" pitchFamily="18" charset="0"/>
@@ -19950,7 +19778,7 @@
 </p:sld>
 </file>
 
-<file path=ppt/slides/slide38.xml><?xml version="1.0" encoding="utf-8"?>
+<file path=ppt/slides/slide37.xml><?xml version="1.0" encoding="utf-8"?>
 <p:sld xmlns:a="http://schemas.openxmlformats.org/drawingml/2006/main" xmlns:r="http://schemas.openxmlformats.org/officeDocument/2006/relationships" xmlns:p="http://schemas.openxmlformats.org/presentationml/2006/main">
   <p:cSld>
     <p:spTree>
@@ -20376,7 +20204,7 @@
             <a:fld id="{B6F15528-21DE-4FAA-801E-634DDDAF4B2B}" type="slidenum">
               <a:rPr lang="en-US" smtClean="0"/>
               <a:pPr/>
-              <a:t>38</a:t>
+              <a:t>37</a:t>
             </a:fld>
             <a:endParaRPr lang="en-US"/>
           </a:p>
@@ -20635,7 +20463,7 @@
 </p:sld>
 </file>
 
-<file path=ppt/slides/slide39.xml><?xml version="1.0" encoding="utf-8"?>
+<file path=ppt/slides/slide38.xml><?xml version="1.0" encoding="utf-8"?>
 <p:sld xmlns:a="http://schemas.openxmlformats.org/drawingml/2006/main" xmlns:r="http://schemas.openxmlformats.org/officeDocument/2006/relationships" xmlns:p="http://schemas.openxmlformats.org/presentationml/2006/main">
   <p:cSld>
     <p:spTree>
@@ -20865,7 +20693,7 @@
             <a:fld id="{B6F15528-21DE-4FAA-801E-634DDDAF4B2B}" type="slidenum">
               <a:rPr lang="en-US" smtClean="0"/>
               <a:pPr/>
-              <a:t>39</a:t>
+              <a:t>38</a:t>
             </a:fld>
             <a:endParaRPr lang="en-US"/>
           </a:p>
@@ -20886,158 +20714,7 @@
 </p:sld>
 </file>
 
-<file path=ppt/slides/slide4.xml><?xml version="1.0" encoding="utf-8"?>
-<p:sld xmlns:a="http://schemas.openxmlformats.org/drawingml/2006/main" xmlns:r="http://schemas.openxmlformats.org/officeDocument/2006/relationships" xmlns:p="http://schemas.openxmlformats.org/presentationml/2006/main">
-  <p:cSld>
-    <p:spTree>
-      <p:nvGrpSpPr>
-        <p:cNvPr id="1" name=""/>
-        <p:cNvGrpSpPr/>
-        <p:nvPr/>
-      </p:nvGrpSpPr>
-      <p:grpSpPr>
-        <a:xfrm>
-          <a:off x="0" y="0"/>
-          <a:ext cx="0" cy="0"/>
-          <a:chOff x="0" y="0"/>
-          <a:chExt cx="0" cy="0"/>
-        </a:xfrm>
-      </p:grpSpPr>
-      <p:sp>
-        <p:nvSpPr>
-          <p:cNvPr id="2" name="Title 1"/>
-          <p:cNvSpPr>
-            <a:spLocks noGrp="1"/>
-          </p:cNvSpPr>
-          <p:nvPr>
-            <p:ph type="title"/>
-          </p:nvPr>
-        </p:nvSpPr>
-        <p:spPr/>
-        <p:txBody>
-          <a:bodyPr>
-            <a:normAutofit/>
-          </a:bodyPr>
-          <a:lstStyle/>
-          <a:p>
-            <a:r>
-              <a:rPr lang="en-US" dirty="0" smtClean="0"/>
-              <a:t>Traditional Voltage Control</a:t>
-            </a:r>
-            <a:br>
-              <a:rPr lang="en-US" dirty="0" smtClean="0"/>
-            </a:br>
-            <a:r>
-              <a:rPr lang="en-US" sz="2000" dirty="0" smtClean="0"/>
-              <a:t>(Regulators)</a:t>
-            </a:r>
-            <a:endParaRPr lang="en-US" sz="2000" dirty="0"/>
-          </a:p>
-        </p:txBody>
-      </p:sp>
-      <p:sp>
-        <p:nvSpPr>
-          <p:cNvPr id="3" name="Content Placeholder 2"/>
-          <p:cNvSpPr>
-            <a:spLocks noGrp="1"/>
-          </p:cNvSpPr>
-          <p:nvPr>
-            <p:ph idx="1"/>
-          </p:nvPr>
-        </p:nvSpPr>
-        <p:spPr>
-          <a:xfrm>
-            <a:off x="457200" y="1600201"/>
-            <a:ext cx="8229600" cy="2286000"/>
-          </a:xfrm>
-        </p:spPr>
-        <p:txBody>
-          <a:bodyPr>
-            <a:normAutofit/>
-          </a:bodyPr>
-          <a:lstStyle/>
-          <a:p>
-            <a:r>
-              <a:rPr lang="en-US" sz="2400" dirty="0" smtClean="0"/>
-              <a:t>Regulators are often installed at the substation in order to adjust the voltage at the head of the feeder.</a:t>
-            </a:r>
-            <a:endParaRPr lang="en-US" sz="2400" dirty="0"/>
-          </a:p>
-        </p:txBody>
-      </p:sp>
-      <p:pic>
-        <p:nvPicPr>
-          <p:cNvPr id="1027" name="Picture 3"/>
-          <p:cNvPicPr>
-            <a:picLocks noChangeAspect="1" noChangeArrowheads="1"/>
-          </p:cNvPicPr>
-          <p:nvPr/>
-        </p:nvPicPr>
-        <p:blipFill>
-          <a:blip r:embed="rId2" cstate="print"/>
-          <a:srcRect/>
-          <a:stretch>
-            <a:fillRect/>
-          </a:stretch>
-        </p:blipFill>
-        <p:spPr bwMode="auto">
-          <a:xfrm>
-            <a:off x="2133600" y="3048000"/>
-            <a:ext cx="5033963" cy="2635250"/>
-          </a:xfrm>
-          <a:prstGeom prst="rect">
-            <a:avLst/>
-          </a:prstGeom>
-          <a:noFill/>
-          <a:ln w="9525">
-            <a:noFill/>
-            <a:miter lim="800000"/>
-            <a:headEnd/>
-            <a:tailEnd/>
-          </a:ln>
-          <a:effectLst/>
-        </p:spPr>
-      </p:pic>
-      <p:sp>
-        <p:nvSpPr>
-          <p:cNvPr id="4" name="Slide Number Placeholder 3"/>
-          <p:cNvSpPr>
-            <a:spLocks noGrp="1"/>
-          </p:cNvSpPr>
-          <p:nvPr>
-            <p:ph type="sldNum" sz="quarter" idx="12"/>
-          </p:nvPr>
-        </p:nvSpPr>
-        <p:spPr/>
-        <p:txBody>
-          <a:bodyPr/>
-          <a:lstStyle/>
-          <a:p>
-            <a:fld id="{B6F15528-21DE-4FAA-801E-634DDDAF4B2B}" type="slidenum">
-              <a:rPr lang="en-US" smtClean="0"/>
-              <a:pPr/>
-              <a:t>4</a:t>
-            </a:fld>
-            <a:endParaRPr lang="en-US"/>
-          </a:p>
-        </p:txBody>
-      </p:sp>
-    </p:spTree>
-  </p:cSld>
-  <p:clrMapOvr>
-    <a:masterClrMapping/>
-  </p:clrMapOvr>
-  <p:timing>
-    <p:tnLst>
-      <p:par>
-        <p:cTn id="1" dur="indefinite" restart="never" nodeType="tmRoot"/>
-      </p:par>
-    </p:tnLst>
-  </p:timing>
-</p:sld>
-</file>
-
-<file path=ppt/slides/slide40.xml><?xml version="1.0" encoding="utf-8"?>
+<file path=ppt/slides/slide39.xml><?xml version="1.0" encoding="utf-8"?>
 <p:sld xmlns:a="http://schemas.openxmlformats.org/drawingml/2006/main" xmlns:r="http://schemas.openxmlformats.org/officeDocument/2006/relationships" xmlns:p="http://schemas.openxmlformats.org/presentationml/2006/main">
   <p:cSld>
     <p:spTree>
@@ -21284,7 +20961,7 @@
             <a:fld id="{B6F15528-21DE-4FAA-801E-634DDDAF4B2B}" type="slidenum">
               <a:rPr lang="en-US" smtClean="0"/>
               <a:pPr/>
-              <a:t>40</a:t>
+              <a:t>39</a:t>
             </a:fld>
             <a:endParaRPr lang="en-US"/>
           </a:p>
@@ -21305,7 +20982,166 @@
 </p:sld>
 </file>
 
-<file path=ppt/slides/slide41.xml><?xml version="1.0" encoding="utf-8"?>
+<file path=ppt/slides/slide4.xml><?xml version="1.0" encoding="utf-8"?>
+<p:sld xmlns:a="http://schemas.openxmlformats.org/drawingml/2006/main" xmlns:r="http://schemas.openxmlformats.org/officeDocument/2006/relationships" xmlns:p="http://schemas.openxmlformats.org/presentationml/2006/main">
+  <p:cSld>
+    <p:spTree>
+      <p:nvGrpSpPr>
+        <p:cNvPr id="1" name=""/>
+        <p:cNvGrpSpPr/>
+        <p:nvPr/>
+      </p:nvGrpSpPr>
+      <p:grpSpPr>
+        <a:xfrm>
+          <a:off x="0" y="0"/>
+          <a:ext cx="0" cy="0"/>
+          <a:chOff x="0" y="0"/>
+          <a:chExt cx="0" cy="0"/>
+        </a:xfrm>
+      </p:grpSpPr>
+      <p:sp>
+        <p:nvSpPr>
+          <p:cNvPr id="2" name="Title 1"/>
+          <p:cNvSpPr>
+            <a:spLocks noGrp="1"/>
+          </p:cNvSpPr>
+          <p:nvPr>
+            <p:ph type="title"/>
+          </p:nvPr>
+        </p:nvSpPr>
+        <p:spPr/>
+        <p:txBody>
+          <a:bodyPr>
+            <a:normAutofit/>
+          </a:bodyPr>
+          <a:lstStyle/>
+          <a:p>
+            <a:r>
+              <a:rPr lang="en-US" dirty="0" smtClean="0"/>
+              <a:t>Traditional Voltage </a:t>
+            </a:r>
+            <a:r>
+              <a:rPr lang="en-US" dirty="0" smtClean="0"/>
+              <a:t>Control Cont.</a:t>
+            </a:r>
+            <a:r>
+              <a:rPr lang="en-US" dirty="0" smtClean="0"/>
+              <a:t/>
+            </a:r>
+            <a:br>
+              <a:rPr lang="en-US" dirty="0" smtClean="0"/>
+            </a:br>
+            <a:r>
+              <a:rPr lang="en-US" sz="2000" dirty="0" smtClean="0"/>
+              <a:t>(Regulators)</a:t>
+            </a:r>
+            <a:endParaRPr lang="en-US" sz="2000" dirty="0"/>
+          </a:p>
+        </p:txBody>
+      </p:sp>
+      <p:sp>
+        <p:nvSpPr>
+          <p:cNvPr id="3" name="Content Placeholder 2"/>
+          <p:cNvSpPr>
+            <a:spLocks noGrp="1"/>
+          </p:cNvSpPr>
+          <p:nvPr>
+            <p:ph idx="1"/>
+          </p:nvPr>
+        </p:nvSpPr>
+        <p:spPr>
+          <a:xfrm>
+            <a:off x="457200" y="1600201"/>
+            <a:ext cx="8229600" cy="2286000"/>
+          </a:xfrm>
+        </p:spPr>
+        <p:txBody>
+          <a:bodyPr>
+            <a:normAutofit/>
+          </a:bodyPr>
+          <a:lstStyle/>
+          <a:p>
+            <a:r>
+              <a:rPr lang="en-US" sz="2400" dirty="0" smtClean="0"/>
+              <a:t>Regulators are often installed at the substation in order to adjust the voltage at the head of the feeder.</a:t>
+            </a:r>
+            <a:endParaRPr lang="en-US" sz="2400" dirty="0"/>
+          </a:p>
+        </p:txBody>
+      </p:sp>
+      <p:pic>
+        <p:nvPicPr>
+          <p:cNvPr id="1027" name="Picture 3"/>
+          <p:cNvPicPr>
+            <a:picLocks noChangeAspect="1" noChangeArrowheads="1"/>
+          </p:cNvPicPr>
+          <p:nvPr/>
+        </p:nvPicPr>
+        <p:blipFill>
+          <a:blip r:embed="rId2" cstate="print"/>
+          <a:srcRect/>
+          <a:stretch>
+            <a:fillRect/>
+          </a:stretch>
+        </p:blipFill>
+        <p:spPr bwMode="auto">
+          <a:xfrm>
+            <a:off x="2133600" y="3048000"/>
+            <a:ext cx="5033963" cy="2635250"/>
+          </a:xfrm>
+          <a:prstGeom prst="rect">
+            <a:avLst/>
+          </a:prstGeom>
+          <a:noFill/>
+          <a:ln w="9525">
+            <a:noFill/>
+            <a:miter lim="800000"/>
+            <a:headEnd/>
+            <a:tailEnd/>
+          </a:ln>
+          <a:effectLst/>
+        </p:spPr>
+      </p:pic>
+      <p:sp>
+        <p:nvSpPr>
+          <p:cNvPr id="4" name="Slide Number Placeholder 3"/>
+          <p:cNvSpPr>
+            <a:spLocks noGrp="1"/>
+          </p:cNvSpPr>
+          <p:nvPr>
+            <p:ph type="sldNum" sz="quarter" idx="12"/>
+          </p:nvPr>
+        </p:nvSpPr>
+        <p:spPr/>
+        <p:txBody>
+          <a:bodyPr/>
+          <a:lstStyle/>
+          <a:p>
+            <a:fld id="{B6F15528-21DE-4FAA-801E-634DDDAF4B2B}" type="slidenum">
+              <a:rPr lang="en-US" smtClean="0"/>
+              <a:pPr/>
+              <a:t>4</a:t>
+            </a:fld>
+            <a:endParaRPr lang="en-US"/>
+          </a:p>
+        </p:txBody>
+      </p:sp>
+    </p:spTree>
+  </p:cSld>
+  <p:clrMapOvr>
+    <a:masterClrMapping/>
+  </p:clrMapOvr>
+  <p:timing>
+    <p:tnLst>
+      <p:par>
+        <p:cTn id="1" dur="indefinite" restart="never" nodeType="tmRoot"/>
+      </p:par>
+    </p:tnLst>
+  </p:timing>
+</p:sld>
+</file>
+
+<file path=ppt/slides/slide40.xml><?xml version="1.0" encoding="utf-8"?>
 <p:sld xmlns:a="http://schemas.openxmlformats.org/drawingml/2006/main" xmlns:r="http://schemas.openxmlformats.org/officeDocument/2006/relationships" xmlns:p="http://schemas.openxmlformats.org/presentationml/2006/main">
   <p:cSld>
     <p:spTree>
@@ -21676,7 +21512,7 @@
             <a:fld id="{B6F15528-21DE-4FAA-801E-634DDDAF4B2B}" type="slidenum">
               <a:rPr lang="en-US" smtClean="0"/>
               <a:pPr/>
-              <a:t>41</a:t>
+              <a:t>40</a:t>
             </a:fld>
             <a:endParaRPr lang="en-US"/>
           </a:p>
@@ -21900,7 +21736,7 @@
 </p:sld>
 </file>
 
-<file path=ppt/slides/slide42.xml><?xml version="1.0" encoding="utf-8"?>
+<file path=ppt/slides/slide41.xml><?xml version="1.0" encoding="utf-8"?>
 <p:sld xmlns:a="http://schemas.openxmlformats.org/drawingml/2006/main" xmlns:r="http://schemas.openxmlformats.org/officeDocument/2006/relationships" xmlns:p="http://schemas.openxmlformats.org/presentationml/2006/main">
   <p:cSld>
     <p:spTree>
@@ -22001,7 +21837,7 @@
             <a:fld id="{B6F15528-21DE-4FAA-801E-634DDDAF4B2B}" type="slidenum">
               <a:rPr lang="en-US" smtClean="0"/>
               <a:pPr/>
-              <a:t>42</a:t>
+              <a:t>41</a:t>
             </a:fld>
             <a:endParaRPr lang="en-US"/>
           </a:p>
@@ -22063,7 +21899,15 @@
           <a:p>
             <a:r>
               <a:rPr lang="en-US" dirty="0" smtClean="0"/>
-              <a:t>Traditional Voltage Control</a:t>
+              <a:t>Traditional Voltage </a:t>
+            </a:r>
+            <a:r>
+              <a:rPr lang="en-US" dirty="0" smtClean="0"/>
+              <a:t>Control Cont.</a:t>
+            </a:r>
+            <a:r>
+              <a:rPr lang="en-US" dirty="0" smtClean="0"/>
+              <a:t/>
             </a:r>
             <a:br>
               <a:rPr lang="en-US" dirty="0" smtClean="0"/>
@@ -22369,7 +22213,7 @@
           <a:p>
             <a:r>
               <a:rPr lang="en-US" dirty="0" smtClean="0"/>
-              <a:t>ANSI C84.1</a:t>
+              <a:t>Operation of Voltage Control Devices</a:t>
             </a:r>
             <a:endParaRPr lang="en-US" dirty="0"/>
           </a:p>
@@ -22394,7 +22238,7 @@
           <a:p>
             <a:r>
               <a:rPr lang="en-US" sz="2400" dirty="0" smtClean="0"/>
-              <a:t>American National Standards Institute (ANSI) C84.1 standard defines operating limits for distribution systems.</a:t>
+              <a:t>Voltage control devices, both regulators and shunt capacitors, traditionally have been operated in a stand alone mode.</a:t>
             </a:r>
           </a:p>
           <a:p>
@@ -22403,7 +22247,7 @@
           <a:p>
             <a:r>
               <a:rPr lang="en-US" sz="2400" dirty="0" smtClean="0"/>
-              <a:t>Range A (normal steady-state):114V-126V (RMS)</a:t>
+              <a:t>Operation is achieved through manual operation, local set points, and on occasion remote measurements.</a:t>
             </a:r>
           </a:p>
           <a:p>
@@ -22412,17 +22256,9 @@
           <a:p>
             <a:r>
               <a:rPr lang="en-US" sz="2400" dirty="0" smtClean="0"/>
-              <a:t>Range B (emergency steady-state):107V-127V (RMS)</a:t>
-            </a:r>
-          </a:p>
-          <a:p>
-            <a:endParaRPr lang="en-US" sz="2400" dirty="0" smtClean="0"/>
-          </a:p>
-          <a:p>
-            <a:r>
-              <a:rPr lang="en-US" sz="2400" dirty="0" smtClean="0"/>
-              <a:t>&lt;3% voltage unbalance at the utility meter</a:t>
-            </a:r>
+              <a:t>While the set points may be coordinated, it is a static coordination and does not account for time dependant variations in the system behavior.</a:t>
+            </a:r>
+            <a:endParaRPr lang="en-US" sz="2400" dirty="0"/>
           </a:p>
         </p:txBody>
       </p:sp>
@@ -22494,14 +22330,12 @@
         </p:nvSpPr>
         <p:spPr/>
         <p:txBody>
-          <a:bodyPr>
-            <a:normAutofit/>
-          </a:bodyPr>
+          <a:bodyPr/>
           <a:lstStyle/>
           <a:p>
             <a:r>
               <a:rPr lang="en-US" dirty="0" smtClean="0"/>
-              <a:t>Operation of Voltage Control Devices</a:t>
+              <a:t>Part 2: Volt-VAR Optimization</a:t>
             </a:r>
             <a:endParaRPr lang="en-US" dirty="0"/>
           </a:p>
@@ -22520,33 +22354,56 @@
         <p:spPr/>
         <p:txBody>
           <a:bodyPr>
-            <a:normAutofit/>
+            <a:normAutofit fontScale="92500" lnSpcReduction="20000"/>
           </a:bodyPr>
           <a:lstStyle/>
           <a:p>
             <a:r>
-              <a:rPr lang="en-US" sz="2400" dirty="0" smtClean="0"/>
-              <a:t>Voltage control devices, both regulators and shunt capacitors, traditionally have been operated in a stand alone mode.</a:t>
-            </a:r>
-          </a:p>
-          <a:p>
-            <a:endParaRPr lang="en-US" sz="2400" dirty="0" smtClean="0"/>
-          </a:p>
-          <a:p>
-            <a:r>
-              <a:rPr lang="en-US" sz="2400" dirty="0" smtClean="0"/>
-              <a:t>Operation is achieved through manual operation, local set points, and on occasion remote measurements.</a:t>
-            </a:r>
-          </a:p>
-          <a:p>
-            <a:endParaRPr lang="en-US" sz="2400" dirty="0" smtClean="0"/>
-          </a:p>
-          <a:p>
-            <a:r>
-              <a:rPr lang="en-US" sz="2400" dirty="0" smtClean="0"/>
-              <a:t>While the set points may be coordinated, it is a static coordination and does not account for time dependant variations in the system behavior.</a:t>
-            </a:r>
-            <a:endParaRPr lang="en-US" sz="2400" dirty="0"/>
+              <a:rPr lang="en-US" dirty="0" smtClean="0"/>
+              <a:t>In contrast to the traditional operational methods, Volt-VAR Optimization controls multiple devices to achieve a global optimum.</a:t>
+            </a:r>
+          </a:p>
+          <a:p>
+            <a:endParaRPr lang="en-US" dirty="0"/>
+          </a:p>
+          <a:p>
+            <a:r>
+              <a:rPr lang="en-US" dirty="0" smtClean="0"/>
+              <a:t>Volt-VAR Optimization, and the associated global optimum(s), exists in many forms.</a:t>
+            </a:r>
+          </a:p>
+          <a:p>
+            <a:endParaRPr lang="en-US" dirty="0" smtClean="0"/>
+          </a:p>
+          <a:p>
+            <a:r>
+              <a:rPr lang="en-US" dirty="0" smtClean="0"/>
+              <a:t>The general principle is to control the voltage and reactive power on a distribution feeder so that load can be managed.</a:t>
+            </a:r>
+          </a:p>
+          <a:p>
+            <a:endParaRPr lang="en-US" dirty="0"/>
+          </a:p>
+          <a:p>
+            <a:r>
+              <a:rPr lang="en-US" dirty="0" smtClean="0"/>
+              <a:t>One example of VVO:</a:t>
+            </a:r>
+          </a:p>
+          <a:p>
+            <a:pPr lvl="1"/>
+            <a:r>
+              <a:rPr lang="en-US" dirty="0" smtClean="0"/>
+              <a:t>Voltage optimization involves “flattening” the voltage profile and possibly lowering the level.</a:t>
+            </a:r>
+          </a:p>
+          <a:p>
+            <a:pPr lvl="1"/>
+            <a:r>
+              <a:rPr lang="en-US" dirty="0" smtClean="0"/>
+              <a:t>VAR optimization involves controlling the flow of reactive power, which has an impact on voltage.</a:t>
+            </a:r>
+            <a:endParaRPr lang="en-US" dirty="0"/>
           </a:p>
         </p:txBody>
       </p:sp>
@@ -22623,7 +22480,7 @@
           <a:p>
             <a:r>
               <a:rPr lang="en-US" dirty="0" smtClean="0"/>
-              <a:t>Part 2: Volt-VAR Optimization</a:t>
+              <a:t>Volt-VAR Optimization</a:t>
             </a:r>
             <a:endParaRPr lang="en-US" dirty="0"/>
           </a:p>
@@ -22642,54 +22499,62 @@
         <p:spPr/>
         <p:txBody>
           <a:bodyPr>
-            <a:normAutofit fontScale="92500" lnSpcReduction="20000"/>
+            <a:normAutofit lnSpcReduction="10000"/>
           </a:bodyPr>
           <a:lstStyle/>
           <a:p>
             <a:r>
               <a:rPr lang="en-US" dirty="0" smtClean="0"/>
-              <a:t>In contrast to the traditional operational methods, Volt-VAR Optimization controls multiple devices to achieve a global optimum.</a:t>
-            </a:r>
-          </a:p>
-          <a:p>
-            <a:endParaRPr lang="en-US" dirty="0"/>
-          </a:p>
-          <a:p>
+              <a:t>Voltage Reduction</a:t>
+            </a:r>
+          </a:p>
+          <a:p>
+            <a:pPr lvl="1"/>
             <a:r>
               <a:rPr lang="en-US" dirty="0" smtClean="0"/>
-              <a:t>Volt-VAR Optimization, and the associated global optimum(s), exists in many forms.</a:t>
-            </a:r>
-          </a:p>
-          <a:p>
+              <a:t>When lowering the voltage it is necessary to ensure that the voltage on all points of the system remain within specifications. </a:t>
+            </a:r>
+          </a:p>
+          <a:p>
+            <a:pPr lvl="1"/>
+            <a:r>
+              <a:rPr lang="en-US" dirty="0" smtClean="0"/>
+              <a:t>The use of End Of Line (EOL) measurements can help to ensure that voltages at remote points are not too low.</a:t>
+            </a:r>
+          </a:p>
+          <a:p>
+            <a:pPr lvl="1"/>
+            <a:r>
+              <a:rPr lang="en-US" dirty="0" smtClean="0"/>
+              <a:t>This is similar to operating a regulator in “REMOTE” except that there can be multiple measurement points</a:t>
+            </a:r>
+            <a:r>
+              <a:rPr lang="en-US" dirty="0" smtClean="0"/>
+              <a:t>.</a:t>
+            </a:r>
+          </a:p>
+          <a:p>
+            <a:pPr lvl="1"/>
             <a:endParaRPr lang="en-US" dirty="0" smtClean="0"/>
           </a:p>
           <a:p>
             <a:r>
               <a:rPr lang="en-US" dirty="0" smtClean="0"/>
-              <a:t>The general principle is to control the voltage and reactive power on a distribution feeder so that load can be managed.</a:t>
-            </a:r>
-          </a:p>
-          <a:p>
-            <a:endParaRPr lang="en-US" dirty="0"/>
-          </a:p>
-          <a:p>
+              <a:t>VAR Optimization</a:t>
+            </a:r>
+          </a:p>
+          <a:p>
+            <a:pPr lvl="1"/>
             <a:r>
               <a:rPr lang="en-US" dirty="0" smtClean="0"/>
-              <a:t>One example of VVO:</a:t>
+              <a:t>When capacitors operate based on local readings there is no regard for the rest of the system.</a:t>
             </a:r>
           </a:p>
           <a:p>
             <a:pPr lvl="1"/>
             <a:r>
               <a:rPr lang="en-US" dirty="0" smtClean="0"/>
-              <a:t>Voltage optimization involves “flattening” the voltage profile and possibly lowering the level.</a:t>
-            </a:r>
-          </a:p>
-          <a:p>
-            <a:pPr lvl="1"/>
-            <a:r>
-              <a:rPr lang="en-US" dirty="0" smtClean="0"/>
-              <a:t>VAR optimization involves controlling the flow of reactive power, which has an impact on voltage.</a:t>
+              <a:t>VAR optimization allows capacitors to work in a coordinate manner to reduce overall reactive power flows, thus reducing system losses.</a:t>
             </a:r>
             <a:endParaRPr lang="en-US" dirty="0"/>
           </a:p>

</xml_diff>